<commit_message>
Description: update docker images commands and remove test codes.
</commit_message>
<xml_diff>
--- a/old-docs/system_architecture_.pptx
+++ b/old-docs/system_architecture_.pptx
@@ -204,7 +204,7 @@
           <a:p>
             <a:fld id="{0F9B84EA-7D68-4D60-9CB1-D50884785D1C}" type="datetimeFigureOut">
               <a:rPr lang="zh-CN" altLang="en-US" smtClean="0"/>
-              <a:t>2019/5/27</a:t>
+              <a:t>2020/8/25</a:t>
             </a:fld>
             <a:endParaRPr lang="zh-CN" altLang="en-US"/>
           </a:p>
@@ -364,7 +364,7 @@
           <a:p>
             <a:fld id="{D2A48B96-639E-45A3-A0BA-2464DFDB1FAA}" type="datetimeFigureOut">
               <a:rPr lang="zh-CN" altLang="en-US" smtClean="0"/>
-              <a:t>2019/5/27</a:t>
+              <a:t>2020/8/25</a:t>
             </a:fld>
             <a:endParaRPr lang="zh-CN" altLang="en-US"/>
           </a:p>
@@ -989,7 +989,7 @@
           <a:p>
             <a:fld id="{D997B5FA-0921-464F-AAE1-844C04324D75}" type="datetimeFigureOut">
               <a:rPr lang="zh-CN" altLang="en-US" smtClean="0"/>
-              <a:t>2019/5/27</a:t>
+              <a:t>2020/8/25</a:t>
             </a:fld>
             <a:endParaRPr lang="zh-CN" altLang="en-US"/>
           </a:p>
@@ -1152,7 +1152,7 @@
           <a:p>
             <a:fld id="{D997B5FA-0921-464F-AAE1-844C04324D75}" type="datetimeFigureOut">
               <a:rPr lang="zh-CN" altLang="en-US" smtClean="0"/>
-              <a:t>2019/5/27</a:t>
+              <a:t>2020/8/25</a:t>
             </a:fld>
             <a:endParaRPr lang="zh-CN" altLang="en-US"/>
           </a:p>
@@ -1325,7 +1325,7 @@
           <a:p>
             <a:fld id="{D997B5FA-0921-464F-AAE1-844C04324D75}" type="datetimeFigureOut">
               <a:rPr lang="zh-CN" altLang="en-US" smtClean="0"/>
-              <a:t>2019/5/27</a:t>
+              <a:t>2020/8/25</a:t>
             </a:fld>
             <a:endParaRPr lang="zh-CN" altLang="en-US"/>
           </a:p>
@@ -1488,7 +1488,7 @@
           <a:p>
             <a:fld id="{D997B5FA-0921-464F-AAE1-844C04324D75}" type="datetimeFigureOut">
               <a:rPr lang="zh-CN" altLang="en-US" smtClean="0"/>
-              <a:t>2019/5/27</a:t>
+              <a:t>2020/8/25</a:t>
             </a:fld>
             <a:endParaRPr lang="zh-CN" altLang="en-US"/>
           </a:p>
@@ -1728,7 +1728,7 @@
           <a:p>
             <a:fld id="{D997B5FA-0921-464F-AAE1-844C04324D75}" type="datetimeFigureOut">
               <a:rPr lang="zh-CN" altLang="en-US" smtClean="0"/>
-              <a:t>2019/5/27</a:t>
+              <a:t>2020/8/25</a:t>
             </a:fld>
             <a:endParaRPr lang="zh-CN" altLang="en-US"/>
           </a:p>
@@ -1952,7 +1952,7 @@
           <a:p>
             <a:fld id="{D997B5FA-0921-464F-AAE1-844C04324D75}" type="datetimeFigureOut">
               <a:rPr lang="zh-CN" altLang="en-US" smtClean="0"/>
-              <a:t>2019/5/27</a:t>
+              <a:t>2020/8/25</a:t>
             </a:fld>
             <a:endParaRPr lang="zh-CN" altLang="en-US"/>
           </a:p>
@@ -2311,7 +2311,7 @@
           <a:p>
             <a:fld id="{D997B5FA-0921-464F-AAE1-844C04324D75}" type="datetimeFigureOut">
               <a:rPr lang="zh-CN" altLang="en-US" smtClean="0"/>
-              <a:t>2019/5/27</a:t>
+              <a:t>2020/8/25</a:t>
             </a:fld>
             <a:endParaRPr lang="zh-CN" altLang="en-US"/>
           </a:p>
@@ -2423,7 +2423,7 @@
           <a:p>
             <a:fld id="{D997B5FA-0921-464F-AAE1-844C04324D75}" type="datetimeFigureOut">
               <a:rPr lang="zh-CN" altLang="en-US" smtClean="0"/>
-              <a:t>2019/5/27</a:t>
+              <a:t>2020/8/25</a:t>
             </a:fld>
             <a:endParaRPr lang="zh-CN" altLang="en-US"/>
           </a:p>
@@ -2513,7 +2513,7 @@
           <a:p>
             <a:fld id="{D997B5FA-0921-464F-AAE1-844C04324D75}" type="datetimeFigureOut">
               <a:rPr lang="zh-CN" altLang="en-US" smtClean="0"/>
-              <a:t>2019/5/27</a:t>
+              <a:t>2020/8/25</a:t>
             </a:fld>
             <a:endParaRPr lang="zh-CN" altLang="en-US"/>
           </a:p>
@@ -2783,7 +2783,7 @@
           <a:p>
             <a:fld id="{D997B5FA-0921-464F-AAE1-844C04324D75}" type="datetimeFigureOut">
               <a:rPr lang="zh-CN" altLang="en-US" smtClean="0"/>
-              <a:t>2019/5/27</a:t>
+              <a:t>2020/8/25</a:t>
             </a:fld>
             <a:endParaRPr lang="zh-CN" altLang="en-US"/>
           </a:p>
@@ -3030,7 +3030,7 @@
           <a:p>
             <a:fld id="{D997B5FA-0921-464F-AAE1-844C04324D75}" type="datetimeFigureOut">
               <a:rPr lang="zh-CN" altLang="en-US" smtClean="0"/>
-              <a:t>2019/5/27</a:t>
+              <a:t>2020/8/25</a:t>
             </a:fld>
             <a:endParaRPr lang="zh-CN" altLang="en-US"/>
           </a:p>
@@ -3236,7 +3236,7 @@
           <a:p>
             <a:fld id="{D997B5FA-0921-464F-AAE1-844C04324D75}" type="datetimeFigureOut">
               <a:rPr lang="zh-CN" altLang="en-US" smtClean="0"/>
-              <a:t>2019/5/27</a:t>
+              <a:t>2020/8/25</a:t>
             </a:fld>
             <a:endParaRPr lang="zh-CN" altLang="en-US"/>
           </a:p>
@@ -16169,7 +16169,7 @@
         </p:nvSpPr>
         <p:spPr>
           <a:xfrm>
-            <a:off x="3669736" y="5095707"/>
+            <a:off x="3848152" y="5095707"/>
             <a:ext cx="699575" cy="688126"/>
           </a:xfrm>
           <a:prstGeom prst="flowChartPreparation">
@@ -16230,7 +16230,7 @@
         </p:nvSpPr>
         <p:spPr>
           <a:xfrm>
-            <a:off x="8002178" y="5089204"/>
+            <a:off x="8180594" y="5089204"/>
             <a:ext cx="699575" cy="688126"/>
           </a:xfrm>
           <a:prstGeom prst="flowChartPreparation">
@@ -16291,7 +16291,7 @@
         </p:nvSpPr>
         <p:spPr>
           <a:xfrm>
-            <a:off x="8864344" y="5094646"/>
+            <a:off x="9042760" y="5094646"/>
             <a:ext cx="699575" cy="688126"/>
           </a:xfrm>
           <a:prstGeom prst="flowChartPreparation">
@@ -16364,7 +16364,7 @@
         </p:nvSpPr>
         <p:spPr>
           <a:xfrm>
-            <a:off x="6883077" y="5116873"/>
+            <a:off x="7061493" y="5116873"/>
             <a:ext cx="699575" cy="688126"/>
           </a:xfrm>
           <a:prstGeom prst="flowChartPreparation">
@@ -16425,7 +16425,7 @@
         </p:nvSpPr>
         <p:spPr>
           <a:xfrm>
-            <a:off x="5806464" y="5100803"/>
+            <a:off x="5984880" y="5100803"/>
             <a:ext cx="699575" cy="688126"/>
           </a:xfrm>
           <a:prstGeom prst="flowChartPreparation">
@@ -16486,7 +16486,7 @@
         </p:nvSpPr>
         <p:spPr>
           <a:xfrm>
-            <a:off x="4716224" y="5095707"/>
+            <a:off x="4894640" y="5095707"/>
             <a:ext cx="699575" cy="688126"/>
           </a:xfrm>
           <a:prstGeom prst="flowChartPreparation">
@@ -16547,7 +16547,7 @@
         </p:nvSpPr>
         <p:spPr>
           <a:xfrm>
-            <a:off x="9768999" y="5095707"/>
+            <a:off x="9947415" y="5095707"/>
             <a:ext cx="984345" cy="688126"/>
           </a:xfrm>
           <a:prstGeom prst="flowChartPreparation">
@@ -16597,12 +16597,6 @@
               </a:rPr>
               <a:t>authorization</a:t>
             </a:r>
-            <a:endParaRPr lang="en-US" altLang="zh-CN" sz="1200" dirty="0">
-              <a:solidFill>
-                <a:schemeClr val="tx1"/>
-              </a:solidFill>
-              <a:sym typeface="+mn-ea"/>
-            </a:endParaRPr>
           </a:p>
         </p:txBody>
       </p:sp>
@@ -16614,7 +16608,7 @@
         </p:nvSpPr>
         <p:spPr>
           <a:xfrm>
-            <a:off x="7204877" y="4202119"/>
+            <a:off x="7383293" y="4202119"/>
             <a:ext cx="699575" cy="457378"/>
           </a:xfrm>
           <a:prstGeom prst="flowChartPreparation">
@@ -16687,7 +16681,7 @@
         </p:nvSpPr>
         <p:spPr>
           <a:xfrm>
-            <a:off x="8861471" y="4198160"/>
+            <a:off x="9039887" y="4198160"/>
             <a:ext cx="699575" cy="688126"/>
           </a:xfrm>
           <a:prstGeom prst="flowChartPreparation">
@@ -16729,7 +16723,7 @@
           <a:p>
             <a:pPr lvl="0" algn="ctr"/>
             <a:r>
-              <a:rPr lang="en-US" altLang="zh-CN" sz="1400" dirty="0" smtClean="0">
+              <a:rPr lang="en-US" altLang="zh-CN" sz="1400" dirty="0">
                 <a:solidFill>
                   <a:schemeClr val="tx1"/>
                 </a:solidFill>
@@ -16737,12 +16731,6 @@
               </a:rPr>
               <a:t>user</a:t>
             </a:r>
-            <a:endParaRPr lang="en-US" altLang="zh-CN" sz="1400" dirty="0">
-              <a:solidFill>
-                <a:schemeClr val="tx1"/>
-              </a:solidFill>
-              <a:sym typeface="+mn-ea"/>
-            </a:endParaRPr>
           </a:p>
         </p:txBody>
       </p:sp>
@@ -16754,7 +16742,7 @@
         </p:nvSpPr>
         <p:spPr>
           <a:xfrm>
-            <a:off x="5481935" y="4024969"/>
+            <a:off x="5660351" y="4024969"/>
             <a:ext cx="699575" cy="688126"/>
           </a:xfrm>
           <a:prstGeom prst="flowChartPreparation">
@@ -16815,7 +16803,7 @@
         </p:nvSpPr>
         <p:spPr>
           <a:xfrm>
-            <a:off x="7209499" y="3324136"/>
+            <a:off x="7387915" y="3324136"/>
             <a:ext cx="700373" cy="523260"/>
           </a:xfrm>
           <a:prstGeom prst="flowChartPreparation">
@@ -16888,7 +16876,7 @@
         </p:nvSpPr>
         <p:spPr>
           <a:xfrm>
-            <a:off x="6136480" y="3325760"/>
+            <a:off x="6314896" y="3325760"/>
             <a:ext cx="888085" cy="521636"/>
           </a:xfrm>
           <a:prstGeom prst="flowChartPreparation">
@@ -16961,7 +16949,7 @@
         </p:nvSpPr>
         <p:spPr>
           <a:xfrm>
-            <a:off x="7034122" y="2160967"/>
+            <a:off x="7212538" y="2160967"/>
             <a:ext cx="1029058" cy="688126"/>
           </a:xfrm>
           <a:prstGeom prst="flowChartPreparation">
@@ -17046,7 +17034,7 @@
         </p:nvSpPr>
         <p:spPr>
           <a:xfrm>
-            <a:off x="6272002" y="2172182"/>
+            <a:off x="6450418" y="2172182"/>
             <a:ext cx="700373" cy="688126"/>
           </a:xfrm>
           <a:prstGeom prst="flowChartPreparation">
@@ -17119,7 +17107,7 @@
         </p:nvSpPr>
         <p:spPr>
           <a:xfrm>
-            <a:off x="5292729" y="2171748"/>
+            <a:off x="5471145" y="2171748"/>
             <a:ext cx="699575" cy="688126"/>
           </a:xfrm>
           <a:prstGeom prst="flowChartPreparation">
@@ -17180,7 +17168,7 @@
         </p:nvSpPr>
         <p:spPr>
           <a:xfrm>
-            <a:off x="4371523" y="2185495"/>
+            <a:off x="4549939" y="2185495"/>
             <a:ext cx="699575" cy="688126"/>
           </a:xfrm>
           <a:prstGeom prst="flowChartPreparation">
@@ -17253,7 +17241,7 @@
         </p:nvSpPr>
         <p:spPr>
           <a:xfrm>
-            <a:off x="8993843" y="2171748"/>
+            <a:off x="9172259" y="2171748"/>
             <a:ext cx="699575" cy="688126"/>
           </a:xfrm>
           <a:prstGeom prst="flowChartPreparation">
@@ -17314,7 +17302,7 @@
         </p:nvSpPr>
         <p:spPr>
           <a:xfrm>
-            <a:off x="5661795" y="1084823"/>
+            <a:off x="5840211" y="1084823"/>
             <a:ext cx="699575" cy="688126"/>
           </a:xfrm>
           <a:prstGeom prst="flowChartPreparation">
@@ -17387,7 +17375,7 @@
         </p:nvSpPr>
         <p:spPr>
           <a:xfrm>
-            <a:off x="6796533" y="1029538"/>
+            <a:off x="6974949" y="1029538"/>
             <a:ext cx="1102359" cy="688126"/>
           </a:xfrm>
           <a:prstGeom prst="flowChartPreparation">
@@ -17469,7 +17457,7 @@
         </p:nvSpPr>
         <p:spPr>
           <a:xfrm>
-            <a:off x="9766600" y="3322744"/>
+            <a:off x="9945016" y="3322744"/>
             <a:ext cx="699575" cy="541177"/>
           </a:xfrm>
           <a:prstGeom prst="flowChartPreparation">
@@ -17530,7 +17518,7 @@
         </p:nvSpPr>
         <p:spPr>
           <a:xfrm>
-            <a:off x="8357834" y="1040216"/>
+            <a:off x="8536250" y="1040216"/>
             <a:ext cx="699575" cy="688126"/>
           </a:xfrm>
           <a:prstGeom prst="flowChartPreparation">
@@ -17607,7 +17595,7 @@
         </p:nvSpPr>
         <p:spPr>
           <a:xfrm>
-            <a:off x="8132306" y="2174351"/>
+            <a:off x="8310722" y="2174351"/>
             <a:ext cx="741973" cy="688126"/>
           </a:xfrm>
           <a:prstGeom prst="flowChartPreparation">
@@ -17680,7 +17668,7 @@
         </p:nvSpPr>
         <p:spPr>
           <a:xfrm>
-            <a:off x="9755166" y="2171749"/>
+            <a:off x="9933582" y="2171749"/>
             <a:ext cx="699575" cy="688126"/>
           </a:xfrm>
           <a:prstGeom prst="flowChartPreparation">
@@ -17753,7 +17741,7 @@
         </p:nvCxnSpPr>
         <p:spPr>
           <a:xfrm rot="16200000" flipH="1">
-            <a:off x="7213748" y="953338"/>
+            <a:off x="7392164" y="953338"/>
             <a:ext cx="232905" cy="566"/>
           </a:xfrm>
           <a:prstGeom prst="bentConnector3">
@@ -17793,7 +17781,7 @@
         </p:nvCxnSpPr>
         <p:spPr>
           <a:xfrm rot="10800000" flipV="1">
-            <a:off x="6011584" y="830579"/>
+            <a:off x="6190000" y="830579"/>
             <a:ext cx="1318331" cy="254244"/>
           </a:xfrm>
           <a:prstGeom prst="bentConnector2">
@@ -17831,7 +17819,7 @@
         </p:nvCxnSpPr>
         <p:spPr>
           <a:xfrm>
-            <a:off x="7306324" y="837167"/>
+            <a:off x="7484740" y="837167"/>
             <a:ext cx="1401298" cy="203049"/>
           </a:xfrm>
           <a:prstGeom prst="bentConnector2">
@@ -17870,7 +17858,7 @@
         </p:nvCxnSpPr>
         <p:spPr>
           <a:xfrm rot="16200000" flipH="1">
-            <a:off x="7226531" y="1838846"/>
+            <a:off x="7404947" y="1838846"/>
             <a:ext cx="443303" cy="200938"/>
           </a:xfrm>
           <a:prstGeom prst="bentConnector3">
@@ -17911,7 +17899,7 @@
         </p:nvCxnSpPr>
         <p:spPr>
           <a:xfrm rot="5400000">
-            <a:off x="8382454" y="1849182"/>
+            <a:off x="8560870" y="1849182"/>
             <a:ext cx="446009" cy="204329"/>
           </a:xfrm>
           <a:prstGeom prst="bentConnector3">
@@ -17952,7 +17940,7 @@
         </p:nvCxnSpPr>
         <p:spPr>
           <a:xfrm rot="5400000">
-            <a:off x="6826254" y="2603362"/>
+            <a:off x="7004670" y="2603362"/>
             <a:ext cx="476667" cy="968128"/>
           </a:xfrm>
           <a:prstGeom prst="bentConnector3">
@@ -17993,7 +17981,7 @@
         </p:nvCxnSpPr>
         <p:spPr>
           <a:xfrm rot="16200000" flipH="1">
-            <a:off x="9108516" y="4989029"/>
+            <a:off x="9286932" y="4989029"/>
             <a:ext cx="208359" cy="2873"/>
           </a:xfrm>
           <a:prstGeom prst="bentConnector3">
@@ -18034,7 +18022,7 @@
         </p:nvCxnSpPr>
         <p:spPr>
           <a:xfrm rot="10800000">
-            <a:off x="5992304" y="2515811"/>
+            <a:off x="6170720" y="2515811"/>
             <a:ext cx="279698" cy="434"/>
           </a:xfrm>
           <a:prstGeom prst="bentConnector3">
@@ -18075,7 +18063,7 @@
         </p:nvCxnSpPr>
         <p:spPr>
           <a:xfrm rot="16200000" flipH="1">
-            <a:off x="6117270" y="1667262"/>
+            <a:off x="6295686" y="1667262"/>
             <a:ext cx="399233" cy="610606"/>
           </a:xfrm>
           <a:prstGeom prst="bentConnector3">
@@ -18116,7 +18104,7 @@
         </p:nvCxnSpPr>
         <p:spPr>
           <a:xfrm rot="16200000" flipH="1">
-            <a:off x="8769518" y="2596251"/>
+            <a:off x="8947934" y="2596251"/>
             <a:ext cx="730856" cy="1263307"/>
           </a:xfrm>
           <a:prstGeom prst="bentConnector2">
@@ -18155,7 +18143,7 @@
         </p:nvCxnSpPr>
         <p:spPr>
           <a:xfrm rot="5400000">
-            <a:off x="7844939" y="2927411"/>
+            <a:off x="8023355" y="2927411"/>
             <a:ext cx="723289" cy="593421"/>
           </a:xfrm>
           <a:prstGeom prst="bentConnector2">
@@ -18194,7 +18182,7 @@
         </p:nvCxnSpPr>
         <p:spPr>
           <a:xfrm rot="10800000" flipV="1">
-            <a:off x="5831724" y="3586577"/>
+            <a:off x="6010140" y="3586577"/>
             <a:ext cx="304757" cy="438391"/>
           </a:xfrm>
           <a:prstGeom prst="bentConnector2">
@@ -18233,7 +18221,7 @@
         </p:nvCxnSpPr>
         <p:spPr>
           <a:xfrm rot="16200000" flipH="1">
-            <a:off x="9631505" y="4466039"/>
+            <a:off x="9809921" y="4466039"/>
             <a:ext cx="209421" cy="1049913"/>
           </a:xfrm>
           <a:prstGeom prst="bentConnector3">
@@ -18274,7 +18262,7 @@
         </p:nvCxnSpPr>
         <p:spPr>
           <a:xfrm rot="5400000">
-            <a:off x="5568990" y="3110032"/>
+            <a:off x="5747406" y="3110032"/>
             <a:ext cx="436210" cy="3535141"/>
           </a:xfrm>
           <a:prstGeom prst="bentConnector3">
@@ -18315,7 +18303,7 @@
         </p:nvCxnSpPr>
         <p:spPr>
           <a:xfrm>
-            <a:off x="10104954" y="2859875"/>
+            <a:off x="10283370" y="2859875"/>
             <a:ext cx="11434" cy="462869"/>
           </a:xfrm>
           <a:prstGeom prst="straightConnector1">
@@ -18352,7 +18340,7 @@
         </p:nvCxnSpPr>
         <p:spPr>
           <a:xfrm rot="16200000" flipH="1">
-            <a:off x="7738462" y="4475699"/>
+            <a:off x="7916878" y="4475699"/>
             <a:ext cx="429707" cy="797301"/>
           </a:xfrm>
           <a:prstGeom prst="bentConnector3">
@@ -18392,7 +18380,7 @@
         </p:nvCxnSpPr>
         <p:spPr>
           <a:xfrm>
-            <a:off x="6155412" y="4882046"/>
+            <a:off x="6333828" y="4882046"/>
             <a:ext cx="840" cy="218757"/>
           </a:xfrm>
           <a:prstGeom prst="straightConnector1">
@@ -18429,7 +18417,7 @@
         </p:nvCxnSpPr>
         <p:spPr>
           <a:xfrm>
-            <a:off x="7548651" y="2849093"/>
+            <a:off x="7727067" y="2849093"/>
             <a:ext cx="11035" cy="475043"/>
           </a:xfrm>
           <a:prstGeom prst="straightConnector1">
@@ -18466,7 +18454,7 @@
         </p:nvCxnSpPr>
         <p:spPr>
           <a:xfrm rot="16200000" flipH="1">
-            <a:off x="8803923" y="1632040"/>
+            <a:off x="8982339" y="1632040"/>
             <a:ext cx="443406" cy="636009"/>
           </a:xfrm>
           <a:prstGeom prst="bentConnector3">
@@ -18506,7 +18494,7 @@
         </p:nvCxnSpPr>
         <p:spPr>
           <a:xfrm rot="16200000" flipH="1">
-            <a:off x="5547134" y="2047797"/>
+            <a:off x="5725550" y="2047797"/>
             <a:ext cx="215988" cy="1867635"/>
           </a:xfrm>
           <a:prstGeom prst="bentConnector2">
@@ -18542,7 +18530,7 @@
         </p:nvSpPr>
         <p:spPr>
           <a:xfrm>
-            <a:off x="3849842" y="985289"/>
+            <a:off x="4028258" y="985289"/>
             <a:ext cx="1430060" cy="779715"/>
           </a:xfrm>
           <a:prstGeom prst="flowChartPreparation">
@@ -18629,7 +18617,7 @@
         </p:nvSpPr>
         <p:spPr>
           <a:xfrm>
-            <a:off x="2051184" y="4269828"/>
+            <a:off x="2229600" y="4269828"/>
             <a:ext cx="1227887" cy="383627"/>
           </a:xfrm>
           <a:prstGeom prst="flowChartPreparation">
@@ -18714,7 +18702,7 @@
         </p:nvSpPr>
         <p:spPr>
           <a:xfrm>
-            <a:off x="2173511" y="3606229"/>
+            <a:off x="2351927" y="3606229"/>
             <a:ext cx="854654" cy="319184"/>
           </a:xfrm>
           <a:prstGeom prst="flowChartPreparation">
@@ -18777,7 +18765,7 @@
         </p:nvSpPr>
         <p:spPr>
           <a:xfrm>
-            <a:off x="3243304" y="3567323"/>
+            <a:off x="3421720" y="3567323"/>
             <a:ext cx="734844" cy="409388"/>
           </a:xfrm>
           <a:prstGeom prst="flowChartPreparation">
@@ -18848,7 +18836,7 @@
         </p:nvSpPr>
         <p:spPr>
           <a:xfrm>
-            <a:off x="9672744" y="4149587"/>
+            <a:off x="9851160" y="4149587"/>
             <a:ext cx="887285" cy="660453"/>
           </a:xfrm>
           <a:prstGeom prst="flowChartPreparation">
@@ -18911,7 +18899,7 @@
         </p:nvSpPr>
         <p:spPr>
           <a:xfrm>
-            <a:off x="9521835" y="1200172"/>
+            <a:off x="9700251" y="1200172"/>
             <a:ext cx="908050" cy="368300"/>
           </a:xfrm>
           <a:prstGeom prst="flowChartPreparation">
@@ -18977,7 +18965,7 @@
         </p:nvCxnSpPr>
         <p:spPr>
           <a:xfrm rot="16200000" flipH="1">
-            <a:off x="8026977" y="-748712"/>
+            <a:off x="8205393" y="-748712"/>
             <a:ext cx="592581" cy="3305185"/>
           </a:xfrm>
           <a:prstGeom prst="bentConnector3">
@@ -19015,7 +19003,7 @@
         </p:nvSpPr>
         <p:spPr>
           <a:xfrm>
-            <a:off x="1622239" y="990906"/>
+            <a:off x="1800655" y="990906"/>
             <a:ext cx="2021840" cy="726757"/>
           </a:xfrm>
           <a:prstGeom prst="flowChartPreparation">
@@ -19090,7 +19078,7 @@
         </p:nvSpPr>
         <p:spPr>
           <a:xfrm>
-            <a:off x="1644015" y="2250106"/>
+            <a:off x="1822431" y="2250106"/>
             <a:ext cx="2414334" cy="572256"/>
           </a:xfrm>
           <a:prstGeom prst="flowChartPreparation">
@@ -19165,7 +19153,7 @@
         </p:nvSpPr>
         <p:spPr>
           <a:xfrm>
-            <a:off x="10656975" y="1138602"/>
+            <a:off x="10835391" y="1138602"/>
             <a:ext cx="1072505" cy="442999"/>
           </a:xfrm>
           <a:prstGeom prst="flowChartPreparation">
@@ -19231,7 +19219,7 @@
         </p:nvCxnSpPr>
         <p:spPr>
           <a:xfrm rot="16200000" flipH="1">
-            <a:off x="8666446" y="-1388181"/>
+            <a:off x="8844862" y="-1388181"/>
             <a:ext cx="531011" cy="4522553"/>
           </a:xfrm>
           <a:prstGeom prst="bentConnector3">
@@ -19269,7 +19257,7 @@
         </p:nvSpPr>
         <p:spPr>
           <a:xfrm>
-            <a:off x="10643870" y="2255820"/>
+            <a:off x="10822286" y="2255820"/>
             <a:ext cx="1053465" cy="513080"/>
           </a:xfrm>
           <a:prstGeom prst="flowChartPreparation">
@@ -19332,7 +19320,7 @@
         </p:nvSpPr>
         <p:spPr>
           <a:xfrm>
-            <a:off x="10576559" y="3334316"/>
+            <a:off x="10754975" y="3334316"/>
             <a:ext cx="1188085" cy="513080"/>
           </a:xfrm>
           <a:prstGeom prst="flowChartPreparation">
@@ -19398,7 +19386,7 @@
         </p:nvCxnSpPr>
         <p:spPr>
           <a:xfrm flipH="1">
-            <a:off x="11170602" y="2768900"/>
+            <a:off x="11349018" y="2768900"/>
             <a:ext cx="1" cy="565416"/>
           </a:xfrm>
           <a:prstGeom prst="straightConnector1">
@@ -19431,7 +19419,7 @@
         </p:nvSpPr>
         <p:spPr>
           <a:xfrm>
-            <a:off x="4194492" y="3503448"/>
+            <a:off x="4372908" y="3503448"/>
             <a:ext cx="1053465" cy="513080"/>
           </a:xfrm>
           <a:prstGeom prst="flowChartPreparation">
@@ -19494,7 +19482,7 @@
         </p:nvSpPr>
         <p:spPr>
           <a:xfrm>
-            <a:off x="2140504" y="5247014"/>
+            <a:off x="2318920" y="5247014"/>
             <a:ext cx="1061083" cy="484319"/>
           </a:xfrm>
           <a:prstGeom prst="flowChartPreparation">
@@ -19579,7 +19567,7 @@
         </p:nvSpPr>
         <p:spPr>
           <a:xfrm>
-            <a:off x="1644015" y="139491"/>
+            <a:off x="1822431" y="139491"/>
             <a:ext cx="10053320" cy="468100"/>
           </a:xfrm>
           <a:prstGeom prst="roundRect">
@@ -19639,7 +19627,7 @@
         </p:nvCxnSpPr>
         <p:spPr>
           <a:xfrm rot="5400000">
-            <a:off x="4406355" y="3188491"/>
+            <a:off x="4584771" y="3188491"/>
             <a:ext cx="629827" cy="86"/>
           </a:xfrm>
           <a:prstGeom prst="bentConnector3">
@@ -19680,7 +19668,7 @@
         </p:nvCxnSpPr>
         <p:spPr>
           <a:xfrm rot="16200000" flipH="1">
-            <a:off x="5858780" y="471095"/>
+            <a:off x="6037196" y="471095"/>
             <a:ext cx="395963" cy="2983779"/>
           </a:xfrm>
           <a:prstGeom prst="bentConnector3">
@@ -19721,7 +19709,7 @@
         </p:nvCxnSpPr>
         <p:spPr>
           <a:xfrm rot="16200000" flipH="1">
-            <a:off x="6329409" y="466"/>
+            <a:off x="6507825" y="466"/>
             <a:ext cx="409347" cy="3938421"/>
           </a:xfrm>
           <a:prstGeom prst="bentConnector3">
@@ -19762,7 +19750,7 @@
         </p:nvCxnSpPr>
         <p:spPr>
           <a:xfrm rot="16200000" flipH="1">
-            <a:off x="4869253" y="-518431"/>
+            <a:off x="5047669" y="-518431"/>
             <a:ext cx="443304" cy="4915492"/>
           </a:xfrm>
           <a:prstGeom prst="bentConnector3">
@@ -19803,7 +19791,7 @@
         </p:nvCxnSpPr>
         <p:spPr>
           <a:xfrm rot="16200000" flipH="1">
-            <a:off x="2475949" y="1874872"/>
+            <a:off x="2654365" y="1874872"/>
             <a:ext cx="532443" cy="218023"/>
           </a:xfrm>
           <a:prstGeom prst="bentConnector3">
@@ -19844,7 +19832,7 @@
         </p:nvCxnSpPr>
         <p:spPr>
           <a:xfrm rot="5400000">
-            <a:off x="8466009" y="651115"/>
+            <a:off x="8644425" y="651115"/>
             <a:ext cx="592495" cy="2427209"/>
           </a:xfrm>
           <a:prstGeom prst="bentConnector3">
@@ -19885,7 +19873,7 @@
         </p:nvCxnSpPr>
         <p:spPr>
           <a:xfrm rot="5400000">
-            <a:off x="4696177" y="753755"/>
+            <a:off x="4874593" y="753755"/>
             <a:ext cx="757136" cy="4947813"/>
           </a:xfrm>
           <a:prstGeom prst="bentConnector3">
@@ -19926,7 +19914,7 @@
         </p:nvCxnSpPr>
         <p:spPr>
           <a:xfrm rot="5400000">
-            <a:off x="5220574" y="1239246"/>
+            <a:off x="5398990" y="1239246"/>
             <a:ext cx="718230" cy="3937925"/>
           </a:xfrm>
           <a:prstGeom prst="bentConnector3">
@@ -19964,7 +19952,7 @@
         </p:nvSpPr>
         <p:spPr>
           <a:xfrm>
-            <a:off x="77471" y="605155"/>
+            <a:off x="255887" y="605155"/>
             <a:ext cx="1382178" cy="5052343"/>
           </a:xfrm>
           <a:prstGeom prst="roundRect">
@@ -20130,7 +20118,7 @@
         </p:nvCxnSpPr>
         <p:spPr>
           <a:xfrm rot="5400000">
-            <a:off x="4460260" y="-1219510"/>
+            <a:off x="4638676" y="-1219510"/>
             <a:ext cx="383315" cy="4037516"/>
           </a:xfrm>
           <a:prstGeom prst="bentConnector3">
@@ -20171,7 +20159,7 @@
         </p:nvCxnSpPr>
         <p:spPr>
           <a:xfrm rot="5400000">
-            <a:off x="5428925" y="-256461"/>
+            <a:off x="5607341" y="-256461"/>
             <a:ext cx="377698" cy="2105803"/>
           </a:xfrm>
           <a:prstGeom prst="bentConnector3">
@@ -20212,7 +20200,7 @@
         </p:nvCxnSpPr>
         <p:spPr>
           <a:xfrm rot="5400000">
-            <a:off x="10366574" y="2518715"/>
+            <a:off x="10544990" y="2518715"/>
             <a:ext cx="553844" cy="1054215"/>
           </a:xfrm>
           <a:prstGeom prst="bentConnector3">
@@ -20253,7 +20241,7 @@
         </p:nvCxnSpPr>
         <p:spPr>
           <a:xfrm rot="5400000">
-            <a:off x="10887895" y="3051608"/>
+            <a:off x="11066311" y="3051608"/>
             <a:ext cx="565416" cy="1"/>
           </a:xfrm>
           <a:prstGeom prst="bentConnector3">
@@ -20294,7 +20282,7 @@
         </p:nvCxnSpPr>
         <p:spPr>
           <a:xfrm rot="5400000">
-            <a:off x="9973555" y="4006754"/>
+            <a:off x="10151971" y="4006754"/>
             <a:ext cx="285666" cy="1"/>
           </a:xfrm>
           <a:prstGeom prst="bentConnector3">
@@ -20335,7 +20323,7 @@
         </p:nvCxnSpPr>
         <p:spPr>
           <a:xfrm rot="16200000" flipH="1">
-            <a:off x="3644444" y="3674139"/>
+            <a:off x="3822860" y="3674139"/>
             <a:ext cx="442252" cy="2400884"/>
           </a:xfrm>
           <a:prstGeom prst="bentConnector3">
@@ -20376,7 +20364,7 @@
         </p:nvCxnSpPr>
         <p:spPr>
           <a:xfrm rot="16200000" flipH="1">
-            <a:off x="6890233" y="3537686"/>
+            <a:off x="7068649" y="3537686"/>
             <a:ext cx="354723" cy="974142"/>
           </a:xfrm>
           <a:prstGeom prst="bentConnector3">
@@ -20417,7 +20405,7 @@
         </p:nvCxnSpPr>
         <p:spPr>
           <a:xfrm rot="5400000">
-            <a:off x="7379815" y="4022247"/>
+            <a:off x="7558231" y="4022247"/>
             <a:ext cx="354723" cy="5021"/>
           </a:xfrm>
           <a:prstGeom prst="bentConnector3">
@@ -20458,7 +20446,7 @@
         </p:nvCxnSpPr>
         <p:spPr>
           <a:xfrm rot="16200000" flipH="1">
-            <a:off x="2371308" y="4947275"/>
+            <a:off x="2549724" y="4947275"/>
             <a:ext cx="593559" cy="5918"/>
           </a:xfrm>
           <a:prstGeom prst="bentConnector3">
@@ -20499,7 +20487,7 @@
         </p:nvCxnSpPr>
         <p:spPr>
           <a:xfrm rot="5400000">
-            <a:off x="7165077" y="4727285"/>
+            <a:off x="7343493" y="4727285"/>
             <a:ext cx="457376" cy="321800"/>
           </a:xfrm>
           <a:prstGeom prst="bentConnector3">
@@ -20537,7 +20525,7 @@
         </p:nvSpPr>
         <p:spPr>
           <a:xfrm>
-            <a:off x="1875155" y="5948680"/>
+            <a:off x="2053571" y="5948680"/>
             <a:ext cx="9761220" cy="635635"/>
           </a:xfrm>
           <a:prstGeom prst="roundRect">
@@ -20666,31 +20654,13 @@
           <a:p>
             <a:pPr lvl="0" algn="ctr"/>
             <a:r>
-              <a:rPr lang="en-US" altLang="zh-CN" sz="1400" dirty="0" err="1" smtClean="0">
+              <a:rPr lang="en-US" altLang="zh-CN" sz="1400" dirty="0" err="1">
                 <a:solidFill>
                   <a:schemeClr val="tx1"/>
                 </a:solidFill>
                 <a:sym typeface="+mn-ea"/>
               </a:rPr>
               <a:t>Config</a:t>
-            </a:r>
-            <a:endParaRPr lang="en-US" altLang="zh-CN" sz="1400" dirty="0" smtClean="0">
-              <a:solidFill>
-                <a:schemeClr val="tx1"/>
-              </a:solidFill>
-              <a:sym typeface="+mn-ea"/>
-            </a:endParaRPr>
-          </a:p>
-          <a:p>
-            <a:pPr lvl="0" algn="ctr"/>
-            <a:r>
-              <a:rPr lang="en-US" altLang="zh-CN" sz="1400" dirty="0" smtClean="0">
-                <a:solidFill>
-                  <a:schemeClr val="tx1"/>
-                </a:solidFill>
-                <a:sym typeface="+mn-ea"/>
-              </a:rPr>
-              <a:t>15679</a:t>
             </a:r>
             <a:endParaRPr lang="en-US" altLang="zh-CN" sz="1400" dirty="0">
               <a:solidFill>
@@ -20698,6 +20668,18 @@
               </a:solidFill>
               <a:sym typeface="+mn-ea"/>
             </a:endParaRPr>
+          </a:p>
+          <a:p>
+            <a:pPr lvl="0" algn="ctr"/>
+            <a:r>
+              <a:rPr lang="en-US" altLang="zh-CN" sz="1400" dirty="0">
+                <a:solidFill>
+                  <a:schemeClr val="tx1"/>
+                </a:solidFill>
+                <a:sym typeface="+mn-ea"/>
+              </a:rPr>
+              <a:t>15679</a:t>
+            </a:r>
           </a:p>
         </p:txBody>
       </p:sp>
@@ -20751,7 +20733,7 @@
           <a:p>
             <a:pPr lvl="0" algn="ctr"/>
             <a:r>
-              <a:rPr lang="en-US" altLang="zh-CN" sz="1400" dirty="0" smtClean="0">
+              <a:rPr lang="en-US" altLang="zh-CN" sz="1400" dirty="0">
                 <a:solidFill>
                   <a:schemeClr val="tx1"/>
                 </a:solidFill>
@@ -20763,7 +20745,7 @@
           <a:p>
             <a:pPr lvl="0" algn="ctr"/>
             <a:r>
-              <a:rPr lang="en-US" altLang="zh-CN" sz="1400" dirty="0" smtClean="0">
+              <a:rPr lang="en-US" altLang="zh-CN" sz="1400" dirty="0">
                 <a:solidFill>
                   <a:schemeClr val="tx1"/>
                 </a:solidFill>
@@ -20771,12 +20753,6 @@
               </a:rPr>
               <a:t>16579</a:t>
             </a:r>
-            <a:endParaRPr lang="en-US" altLang="zh-CN" sz="1400" dirty="0">
-              <a:solidFill>
-                <a:schemeClr val="tx1"/>
-              </a:solidFill>
-              <a:sym typeface="+mn-ea"/>
-            </a:endParaRPr>
           </a:p>
         </p:txBody>
       </p:sp>
@@ -20842,7 +20818,7 @@
           <a:p>
             <a:pPr lvl="0" algn="ctr"/>
             <a:r>
-              <a:rPr lang="en-US" altLang="zh-CN" sz="1200" dirty="0" smtClean="0">
+              <a:rPr lang="en-US" altLang="zh-CN" sz="1200" dirty="0">
                 <a:solidFill>
                   <a:schemeClr val="tx1"/>
                 </a:solidFill>
@@ -20854,7 +20830,7 @@
           <a:p>
             <a:pPr lvl="0" algn="ctr"/>
             <a:r>
-              <a:rPr lang="en-US" altLang="zh-CN" sz="1200" dirty="0" smtClean="0">
+              <a:rPr lang="en-US" altLang="zh-CN" sz="1200" dirty="0">
                 <a:solidFill>
                   <a:schemeClr val="tx1"/>
                 </a:solidFill>
@@ -20862,12 +20838,6 @@
               </a:rPr>
               <a:t>15678</a:t>
             </a:r>
-            <a:endParaRPr lang="en-US" altLang="zh-CN" sz="1200" dirty="0">
-              <a:solidFill>
-                <a:schemeClr val="tx1"/>
-              </a:solidFill>
-              <a:sym typeface="+mn-ea"/>
-            </a:endParaRPr>
           </a:p>
         </p:txBody>
       </p:sp>
@@ -20921,7 +20891,7 @@
           <a:p>
             <a:pPr lvl="0" algn="ctr"/>
             <a:r>
-              <a:rPr lang="en-US" altLang="zh-CN" sz="1400" dirty="0" smtClean="0">
+              <a:rPr lang="en-US" altLang="zh-CN" sz="1400" dirty="0">
                 <a:solidFill>
                   <a:schemeClr val="tx1"/>
                 </a:solidFill>
@@ -20933,7 +20903,7 @@
           <a:p>
             <a:pPr lvl="0" algn="ctr"/>
             <a:r>
-              <a:rPr lang="en-US" altLang="zh-CN" sz="1400" dirty="0" smtClean="0">
+              <a:rPr lang="en-US" altLang="zh-CN" sz="1400" dirty="0">
                 <a:solidFill>
                   <a:schemeClr val="tx1"/>
                 </a:solidFill>
@@ -20941,12 +20911,6 @@
               </a:rPr>
               <a:t>12347</a:t>
             </a:r>
-            <a:endParaRPr lang="en-US" altLang="zh-CN" sz="1400" dirty="0">
-              <a:solidFill>
-                <a:schemeClr val="tx1"/>
-              </a:solidFill>
-              <a:sym typeface="+mn-ea"/>
-            </a:endParaRPr>
           </a:p>
         </p:txBody>
       </p:sp>
@@ -21000,7 +20964,7 @@
           <a:p>
             <a:pPr lvl="0" algn="ctr"/>
             <a:r>
-              <a:rPr lang="en-US" altLang="zh-CN" sz="1400" dirty="0" smtClean="0">
+              <a:rPr lang="en-US" altLang="zh-CN" sz="1400" dirty="0">
                 <a:solidFill>
                   <a:schemeClr val="tx1"/>
                 </a:solidFill>
@@ -21012,7 +20976,7 @@
           <a:p>
             <a:pPr lvl="0" algn="ctr"/>
             <a:r>
-              <a:rPr lang="en-US" altLang="zh-CN" sz="1400" dirty="0" smtClean="0">
+              <a:rPr lang="en-US" altLang="zh-CN" sz="1400" dirty="0">
                 <a:solidFill>
                   <a:schemeClr val="tx1"/>
                 </a:solidFill>
@@ -21020,12 +20984,6 @@
               </a:rPr>
               <a:t>14567</a:t>
             </a:r>
-            <a:endParaRPr lang="en-US" altLang="zh-CN" sz="1400" dirty="0">
-              <a:solidFill>
-                <a:schemeClr val="tx1"/>
-              </a:solidFill>
-              <a:sym typeface="+mn-ea"/>
-            </a:endParaRPr>
           </a:p>
         </p:txBody>
       </p:sp>
@@ -21079,7 +21037,7 @@
           <a:p>
             <a:pPr lvl="0" algn="ctr"/>
             <a:r>
-              <a:rPr lang="en-US" altLang="zh-CN" sz="1400" dirty="0" smtClean="0">
+              <a:rPr lang="en-US" altLang="zh-CN" sz="1400" dirty="0">
                 <a:solidFill>
                   <a:schemeClr val="tx1"/>
                 </a:solidFill>
@@ -21091,7 +21049,7 @@
           <a:p>
             <a:pPr lvl="0" algn="ctr"/>
             <a:r>
-              <a:rPr lang="en-US" altLang="zh-CN" sz="1400" dirty="0" smtClean="0">
+              <a:rPr lang="en-US" altLang="zh-CN" sz="1400" dirty="0">
                 <a:solidFill>
                   <a:schemeClr val="tx1"/>
                 </a:solidFill>
@@ -21099,12 +21057,6 @@
               </a:rPr>
               <a:t>12345</a:t>
             </a:r>
-            <a:endParaRPr lang="en-US" altLang="zh-CN" sz="1400" dirty="0">
-              <a:solidFill>
-                <a:schemeClr val="tx1"/>
-              </a:solidFill>
-              <a:sym typeface="+mn-ea"/>
-            </a:endParaRPr>
           </a:p>
         </p:txBody>
       </p:sp>
@@ -21176,22 +21128,13 @@
                 </a:solidFill>
                 <a:sym typeface="+mn-ea"/>
               </a:rPr>
-              <a:t> </a:t>
-            </a:r>
-            <a:r>
-              <a:rPr lang="en-US" altLang="zh-CN" sz="1200" dirty="0" smtClean="0">
-                <a:solidFill>
-                  <a:schemeClr val="tx1"/>
-                </a:solidFill>
-                <a:sym typeface="+mn-ea"/>
-              </a:rPr>
-              <a:t>sign-on</a:t>
-            </a:r>
-          </a:p>
-          <a:p>
-            <a:pPr lvl="0" algn="ctr"/>
-            <a:r>
-              <a:rPr lang="en-US" altLang="zh-CN" sz="1200" dirty="0" smtClean="0">
+              <a:t> sign-on</a:t>
+            </a:r>
+          </a:p>
+          <a:p>
+            <a:pPr lvl="0" algn="ctr"/>
+            <a:r>
+              <a:rPr lang="en-US" altLang="zh-CN" sz="1200" dirty="0">
                 <a:solidFill>
                   <a:schemeClr val="tx1"/>
                 </a:solidFill>
@@ -21199,12 +21142,6 @@
               </a:rPr>
               <a:t>12349</a:t>
             </a:r>
-            <a:endParaRPr lang="en-US" altLang="zh-CN" sz="1200" dirty="0">
-              <a:solidFill>
-                <a:schemeClr val="tx1"/>
-              </a:solidFill>
-              <a:sym typeface="+mn-ea"/>
-            </a:endParaRPr>
           </a:p>
         </p:txBody>
       </p:sp>
@@ -21270,7 +21207,7 @@
           <a:p>
             <a:pPr lvl="0" algn="ctr"/>
             <a:r>
-              <a:rPr lang="en-US" altLang="zh-CN" sz="1200" dirty="0" smtClean="0">
+              <a:rPr lang="en-US" altLang="zh-CN" sz="1200" dirty="0">
                 <a:solidFill>
                   <a:schemeClr val="tx1"/>
                 </a:solidFill>
@@ -21282,7 +21219,7 @@
           <a:p>
             <a:pPr lvl="0" algn="ctr"/>
             <a:r>
-              <a:rPr lang="en-US" altLang="zh-CN" sz="1200" dirty="0" smtClean="0">
+              <a:rPr lang="en-US" altLang="zh-CN" sz="1200" dirty="0">
                 <a:solidFill>
                   <a:schemeClr val="tx1"/>
                 </a:solidFill>
@@ -21290,12 +21227,6 @@
               </a:rPr>
               <a:t>15680</a:t>
             </a:r>
-            <a:endParaRPr lang="en-US" altLang="zh-CN" sz="1200" dirty="0">
-              <a:solidFill>
-                <a:schemeClr val="tx1"/>
-              </a:solidFill>
-              <a:sym typeface="+mn-ea"/>
-            </a:endParaRPr>
           </a:p>
         </p:txBody>
       </p:sp>
@@ -21349,7 +21280,7 @@
           <a:p>
             <a:pPr lvl="0" algn="ctr"/>
             <a:r>
-              <a:rPr lang="en-US" altLang="zh-CN" sz="1400" dirty="0" smtClean="0">
+              <a:rPr lang="en-US" altLang="zh-CN" sz="1400" dirty="0">
                 <a:solidFill>
                   <a:schemeClr val="tx1"/>
                 </a:solidFill>
@@ -21361,7 +21292,7 @@
           <a:p>
             <a:pPr lvl="0" algn="ctr"/>
             <a:r>
-              <a:rPr lang="en-US" altLang="zh-CN" sz="1400" dirty="0" smtClean="0">
+              <a:rPr lang="en-US" altLang="zh-CN" sz="1400" dirty="0">
                 <a:solidFill>
                   <a:schemeClr val="tx1"/>
                 </a:solidFill>
@@ -21369,12 +21300,6 @@
               </a:rPr>
               <a:t>12342</a:t>
             </a:r>
-            <a:endParaRPr lang="en-US" altLang="zh-CN" sz="1400" dirty="0">
-              <a:solidFill>
-                <a:schemeClr val="tx1"/>
-              </a:solidFill>
-              <a:sym typeface="+mn-ea"/>
-            </a:endParaRPr>
           </a:p>
         </p:txBody>
       </p:sp>
@@ -21428,7 +21353,7 @@
           <a:p>
             <a:pPr lvl="0" algn="ctr"/>
             <a:r>
-              <a:rPr lang="en-US" altLang="zh-CN" sz="1400" dirty="0" smtClean="0">
+              <a:rPr lang="en-US" altLang="zh-CN" sz="1400" dirty="0">
                 <a:solidFill>
                   <a:schemeClr val="tx1"/>
                 </a:solidFill>
@@ -21440,7 +21365,7 @@
           <a:p>
             <a:pPr lvl="0" algn="ctr"/>
             <a:r>
-              <a:rPr lang="en-US" altLang="zh-CN" sz="1400" dirty="0" smtClean="0">
+              <a:rPr lang="en-US" altLang="zh-CN" sz="1400" dirty="0">
                 <a:solidFill>
                   <a:schemeClr val="tx1"/>
                 </a:solidFill>
@@ -21448,12 +21373,6 @@
               </a:rPr>
               <a:t>12344</a:t>
             </a:r>
-            <a:endParaRPr lang="en-US" altLang="zh-CN" sz="1400" dirty="0">
-              <a:solidFill>
-                <a:schemeClr val="tx1"/>
-              </a:solidFill>
-              <a:sym typeface="+mn-ea"/>
-            </a:endParaRPr>
           </a:p>
         </p:txBody>
       </p:sp>
@@ -21507,7 +21426,7 @@
           <a:p>
             <a:pPr lvl="0" algn="ctr"/>
             <a:r>
-              <a:rPr lang="en-US" altLang="zh-CN" sz="1400" dirty="0" smtClean="0">
+              <a:rPr lang="en-US" altLang="zh-CN" sz="1400" dirty="0">
                 <a:solidFill>
                   <a:schemeClr val="tx1"/>
                 </a:solidFill>
@@ -21519,7 +21438,7 @@
           <a:p>
             <a:pPr lvl="0" algn="ctr"/>
             <a:r>
-              <a:rPr lang="en-US" altLang="zh-CN" sz="1400" dirty="0" smtClean="0">
+              <a:rPr lang="en-US" altLang="zh-CN" sz="1400" dirty="0">
                 <a:solidFill>
                   <a:schemeClr val="tx1"/>
                 </a:solidFill>
@@ -21527,12 +21446,6 @@
               </a:rPr>
               <a:t>17853</a:t>
             </a:r>
-            <a:endParaRPr lang="en-US" altLang="zh-CN" sz="1400" dirty="0">
-              <a:solidFill>
-                <a:schemeClr val="tx1"/>
-              </a:solidFill>
-              <a:sym typeface="+mn-ea"/>
-            </a:endParaRPr>
           </a:p>
         </p:txBody>
       </p:sp>
@@ -21598,7 +21511,7 @@
           <a:p>
             <a:pPr lvl="0" algn="ctr"/>
             <a:r>
-              <a:rPr lang="en-US" altLang="zh-CN" sz="1200" dirty="0" smtClean="0">
+              <a:rPr lang="en-US" altLang="zh-CN" sz="1200" dirty="0">
                 <a:solidFill>
                   <a:schemeClr val="tx1"/>
                 </a:solidFill>
@@ -21610,7 +21523,7 @@
           <a:p>
             <a:pPr lvl="0" algn="ctr"/>
             <a:r>
-              <a:rPr lang="en-US" altLang="zh-CN" sz="1200" dirty="0" smtClean="0">
+              <a:rPr lang="en-US" altLang="zh-CN" sz="1200" dirty="0">
                 <a:solidFill>
                   <a:schemeClr val="tx1"/>
                 </a:solidFill>
@@ -21618,12 +21531,6 @@
               </a:rPr>
               <a:t>15681</a:t>
             </a:r>
-            <a:endParaRPr lang="en-US" altLang="zh-CN" sz="1200" dirty="0">
-              <a:solidFill>
-                <a:schemeClr val="tx1"/>
-              </a:solidFill>
-              <a:sym typeface="+mn-ea"/>
-            </a:endParaRPr>
           </a:p>
         </p:txBody>
       </p:sp>
@@ -21762,7 +21669,7 @@
           <a:p>
             <a:pPr lvl="0" algn="ctr"/>
             <a:r>
-              <a:rPr lang="en-US" altLang="zh-CN" sz="1000" dirty="0" smtClean="0">
+              <a:rPr lang="en-US" altLang="zh-CN" sz="1000" dirty="0">
                 <a:solidFill>
                   <a:schemeClr val="tx1"/>
                 </a:solidFill>
@@ -21770,17 +21677,11 @@
               </a:rPr>
               <a:t>Travel 2</a:t>
             </a:r>
-            <a:endParaRPr lang="en-US" altLang="zh-CN" sz="1000" dirty="0">
-              <a:solidFill>
-                <a:schemeClr val="tx1"/>
-              </a:solidFill>
-              <a:sym typeface="+mn-ea"/>
-            </a:endParaRPr>
-          </a:p>
-          <a:p>
-            <a:pPr lvl="0" algn="ctr"/>
-            <a:r>
-              <a:rPr lang="en-US" altLang="zh-CN" sz="1000" dirty="0" smtClean="0">
+          </a:p>
+          <a:p>
+            <a:pPr lvl="0" algn="ctr"/>
+            <a:r>
+              <a:rPr lang="en-US" altLang="zh-CN" sz="1000" dirty="0">
                 <a:solidFill>
                   <a:schemeClr val="tx1"/>
                 </a:solidFill>
@@ -21874,7 +21775,7 @@
           <a:p>
             <a:pPr lvl="0" algn="ctr"/>
             <a:r>
-              <a:rPr lang="en-US" altLang="zh-CN" sz="1200" dirty="0" smtClean="0">
+              <a:rPr lang="en-US" altLang="zh-CN" sz="1200" dirty="0">
                 <a:solidFill>
                   <a:schemeClr val="tx1"/>
                 </a:solidFill>
@@ -21886,7 +21787,7 @@
           <a:p>
             <a:pPr lvl="0" algn="ctr"/>
             <a:r>
-              <a:rPr lang="en-US" altLang="zh-CN" sz="1200" dirty="0" smtClean="0">
+              <a:rPr lang="en-US" altLang="zh-CN" sz="1200" dirty="0">
                 <a:solidFill>
                   <a:schemeClr val="tx1"/>
                 </a:solidFill>
@@ -21894,12 +21795,6 @@
               </a:rPr>
               <a:t>18673</a:t>
             </a:r>
-            <a:endParaRPr lang="en-US" altLang="zh-CN" sz="1200" dirty="0">
-              <a:solidFill>
-                <a:schemeClr val="tx1"/>
-              </a:solidFill>
-              <a:sym typeface="+mn-ea"/>
-            </a:endParaRPr>
           </a:p>
         </p:txBody>
       </p:sp>
@@ -21953,7 +21848,7 @@
           <a:p>
             <a:pPr lvl="0" algn="ctr"/>
             <a:r>
-              <a:rPr lang="en-US" altLang="zh-CN" sz="1400" dirty="0" smtClean="0">
+              <a:rPr lang="en-US" altLang="zh-CN" sz="1400" dirty="0">
                 <a:solidFill>
                   <a:schemeClr val="tx1"/>
                 </a:solidFill>
@@ -21965,7 +21860,7 @@
           <a:p>
             <a:pPr lvl="0" algn="ctr"/>
             <a:r>
-              <a:rPr lang="en-US" altLang="zh-CN" sz="1400" dirty="0" smtClean="0">
+              <a:rPr lang="en-US" altLang="zh-CN" sz="1400" dirty="0">
                 <a:solidFill>
                   <a:schemeClr val="tx1"/>
                 </a:solidFill>
@@ -21973,12 +21868,6 @@
               </a:rPr>
               <a:t>19001</a:t>
             </a:r>
-            <a:endParaRPr lang="en-US" altLang="zh-CN" sz="1400" dirty="0">
-              <a:solidFill>
-                <a:schemeClr val="tx1"/>
-              </a:solidFill>
-              <a:sym typeface="+mn-ea"/>
-            </a:endParaRPr>
           </a:p>
         </p:txBody>
       </p:sp>
@@ -22044,7 +21933,7 @@
           <a:p>
             <a:pPr lvl="0" algn="ctr"/>
             <a:r>
-              <a:rPr lang="en-US" altLang="zh-CN" sz="1200" dirty="0" smtClean="0">
+              <a:rPr lang="en-US" altLang="zh-CN" sz="1200" dirty="0">
                 <a:solidFill>
                   <a:schemeClr val="tx1"/>
                 </a:solidFill>
@@ -22056,7 +21945,7 @@
           <a:p>
             <a:pPr lvl="0" algn="ctr"/>
             <a:r>
-              <a:rPr lang="en-US" altLang="zh-CN" sz="1200" dirty="0" smtClean="0">
+              <a:rPr lang="en-US" altLang="zh-CN" sz="1200" dirty="0">
                 <a:solidFill>
                   <a:schemeClr val="tx1"/>
                 </a:solidFill>
@@ -22064,12 +21953,6 @@
               </a:rPr>
               <a:t>12386</a:t>
             </a:r>
-            <a:endParaRPr lang="en-US" altLang="zh-CN" sz="1200" dirty="0">
-              <a:solidFill>
-                <a:schemeClr val="tx1"/>
-              </a:solidFill>
-              <a:sym typeface="+mn-ea"/>
-            </a:endParaRPr>
           </a:p>
         </p:txBody>
       </p:sp>
@@ -22123,7 +22006,7 @@
           <a:p>
             <a:pPr lvl="0" algn="ctr"/>
             <a:r>
-              <a:rPr lang="en-US" altLang="zh-CN" sz="1400" dirty="0" smtClean="0">
+              <a:rPr lang="en-US" altLang="zh-CN" sz="1400" dirty="0">
                 <a:solidFill>
                   <a:schemeClr val="tx1"/>
                 </a:solidFill>
@@ -22135,7 +22018,7 @@
           <a:p>
             <a:pPr lvl="0" algn="ctr"/>
             <a:r>
-              <a:rPr lang="en-US" altLang="zh-CN" sz="1400" dirty="0" smtClean="0">
+              <a:rPr lang="en-US" altLang="zh-CN" sz="1400" dirty="0">
                 <a:solidFill>
                   <a:schemeClr val="tx1"/>
                 </a:solidFill>
@@ -22143,12 +22026,6 @@
               </a:rPr>
               <a:t>11188</a:t>
             </a:r>
-            <a:endParaRPr lang="en-US" altLang="zh-CN" sz="1400" dirty="0">
-              <a:solidFill>
-                <a:schemeClr val="tx1"/>
-              </a:solidFill>
-              <a:sym typeface="+mn-ea"/>
-            </a:endParaRPr>
           </a:p>
         </p:txBody>
       </p:sp>
@@ -22214,7 +22091,7 @@
           <a:p>
             <a:pPr lvl="0" algn="ctr"/>
             <a:r>
-              <a:rPr lang="en-US" altLang="zh-CN" sz="1200" dirty="0" smtClean="0">
+              <a:rPr lang="en-US" altLang="zh-CN" sz="1200" dirty="0">
                 <a:solidFill>
                   <a:schemeClr val="tx1"/>
                 </a:solidFill>
@@ -22226,7 +22103,7 @@
           <a:p>
             <a:pPr lvl="0" algn="ctr"/>
             <a:r>
-              <a:rPr lang="en-US" altLang="zh-CN" sz="1200" dirty="0" smtClean="0">
+              <a:rPr lang="en-US" altLang="zh-CN" sz="1200" dirty="0">
                 <a:solidFill>
                   <a:schemeClr val="tx1"/>
                 </a:solidFill>
@@ -22234,12 +22111,6 @@
               </a:rPr>
               <a:t>18886</a:t>
             </a:r>
-            <a:endParaRPr lang="en-US" altLang="zh-CN" sz="1200" dirty="0">
-              <a:solidFill>
-                <a:schemeClr val="tx1"/>
-              </a:solidFill>
-              <a:sym typeface="+mn-ea"/>
-            </a:endParaRPr>
           </a:p>
         </p:txBody>
       </p:sp>
@@ -22328,18 +22199,13 @@
           <a:p>
             <a:pPr algn="ctr"/>
             <a:r>
-              <a:rPr lang="en-US" altLang="zh-CN" sz="1100" dirty="0" smtClean="0">
+              <a:rPr lang="en-US" altLang="zh-CN" sz="1100" dirty="0">
                 <a:solidFill>
                   <a:schemeClr val="tx1"/>
                 </a:solidFill>
               </a:rPr>
               <a:t>reserve</a:t>
             </a:r>
-            <a:endParaRPr lang="en-US" altLang="zh-CN" sz="1100" dirty="0">
-              <a:solidFill>
-                <a:schemeClr val="tx1"/>
-              </a:solidFill>
-            </a:endParaRPr>
           </a:p>
         </p:txBody>
       </p:sp>
@@ -22393,7 +22259,7 @@
           <a:p>
             <a:pPr lvl="0" algn="ctr"/>
             <a:r>
-              <a:rPr lang="en-US" altLang="zh-CN" sz="1400" dirty="0" smtClean="0">
+              <a:rPr lang="en-US" altLang="zh-CN" sz="1400" dirty="0">
                 <a:solidFill>
                   <a:schemeClr val="tx1"/>
                 </a:solidFill>
@@ -22405,7 +22271,7 @@
           <a:p>
             <a:pPr lvl="0" algn="ctr"/>
             <a:r>
-              <a:rPr lang="en-US" altLang="zh-CN" sz="1400" dirty="0" smtClean="0">
+              <a:rPr lang="en-US" altLang="zh-CN" sz="1400" dirty="0">
                 <a:solidFill>
                   <a:schemeClr val="tx1"/>
                 </a:solidFill>
@@ -22413,12 +22279,6 @@
               </a:rPr>
               <a:t>12031</a:t>
             </a:r>
-            <a:endParaRPr lang="en-US" altLang="zh-CN" sz="1400" dirty="0">
-              <a:solidFill>
-                <a:schemeClr val="tx1"/>
-              </a:solidFill>
-              <a:sym typeface="+mn-ea"/>
-            </a:endParaRPr>
           </a:p>
         </p:txBody>
       </p:sp>
@@ -22484,7 +22344,7 @@
           <a:p>
             <a:pPr lvl="0" algn="ctr"/>
             <a:r>
-              <a:rPr lang="en-US" altLang="zh-CN" sz="1400" dirty="0" smtClean="0">
+              <a:rPr lang="en-US" altLang="zh-CN" sz="1400" dirty="0">
                 <a:solidFill>
                   <a:schemeClr val="tx1"/>
                 </a:solidFill>
@@ -22492,12 +22352,6 @@
               </a:rPr>
               <a:t>14568</a:t>
             </a:r>
-            <a:endParaRPr lang="en-US" altLang="zh-CN" sz="1400" dirty="0">
-              <a:solidFill>
-                <a:schemeClr val="tx1"/>
-              </a:solidFill>
-              <a:sym typeface="+mn-ea"/>
-            </a:endParaRPr>
           </a:p>
         </p:txBody>
       </p:sp>
@@ -22551,7 +22405,7 @@
           <a:p>
             <a:pPr lvl="0" algn="ctr"/>
             <a:r>
-              <a:rPr lang="en-US" altLang="zh-CN" sz="1400" dirty="0" smtClean="0">
+              <a:rPr lang="en-US" altLang="zh-CN" sz="1400" dirty="0">
                 <a:solidFill>
                   <a:schemeClr val="tx1"/>
                 </a:solidFill>
@@ -22563,7 +22417,7 @@
           <a:p>
             <a:pPr lvl="0" algn="ctr"/>
             <a:r>
-              <a:rPr lang="en-US" altLang="zh-CN" sz="1400" dirty="0" smtClean="0">
+              <a:rPr lang="en-US" altLang="zh-CN" sz="1400" dirty="0">
                 <a:solidFill>
                   <a:schemeClr val="tx1"/>
                 </a:solidFill>
@@ -22571,17 +22425,11 @@
               </a:rPr>
               <a:t>12346</a:t>
             </a:r>
-            <a:endParaRPr lang="en-US" altLang="zh-CN" sz="1400" dirty="0">
-              <a:solidFill>
-                <a:schemeClr val="tx1"/>
-              </a:solidFill>
-              <a:sym typeface="+mn-ea"/>
-            </a:endParaRPr>
-          </a:p>
-          <a:p>
-            <a:pPr lvl="0" algn="ctr"/>
-            <a:r>
-              <a:rPr lang="en-US" altLang="zh-CN" sz="1400" dirty="0" smtClean="0">
+          </a:p>
+          <a:p>
+            <a:pPr lvl="0" algn="ctr"/>
+            <a:r>
+              <a:rPr lang="en-US" altLang="zh-CN" sz="1400" dirty="0">
                 <a:solidFill>
                   <a:schemeClr val="tx1"/>
                 </a:solidFill>
@@ -22654,7 +22502,7 @@
           <a:p>
             <a:pPr lvl="0" algn="ctr"/>
             <a:r>
-              <a:rPr lang="en-US" altLang="zh-CN" sz="1200" dirty="0" smtClean="0">
+              <a:rPr lang="en-US" altLang="zh-CN" sz="1200" dirty="0">
                 <a:solidFill>
                   <a:schemeClr val="tx1"/>
                 </a:solidFill>
@@ -22666,7 +22514,7 @@
           <a:p>
             <a:pPr lvl="0" algn="ctr"/>
             <a:r>
-              <a:rPr lang="en-US" altLang="zh-CN" sz="1200" dirty="0" smtClean="0">
+              <a:rPr lang="en-US" altLang="zh-CN" sz="1200" dirty="0">
                 <a:solidFill>
                   <a:schemeClr val="tx1"/>
                 </a:solidFill>
@@ -22674,12 +22522,6 @@
               </a:rPr>
               <a:t>18885</a:t>
             </a:r>
-            <a:endParaRPr lang="en-US" altLang="zh-CN" sz="1200" dirty="0">
-              <a:solidFill>
-                <a:schemeClr val="tx1"/>
-              </a:solidFill>
-              <a:sym typeface="+mn-ea"/>
-            </a:endParaRPr>
           </a:p>
         </p:txBody>
       </p:sp>
@@ -23567,23 +23409,8 @@
                 </a:solidFill>
                 <a:sym typeface="+mn-ea"/>
               </a:rPr>
-              <a:t>Travel </a:t>
-            </a:r>
-            <a:r>
-              <a:rPr lang="en-US" altLang="zh-CN" sz="1400" dirty="0" smtClean="0">
-                <a:solidFill>
-                  <a:schemeClr val="tx1"/>
-                </a:solidFill>
-                <a:sym typeface="+mn-ea"/>
-              </a:rPr>
-              <a:t>admin user16115</a:t>
-            </a:r>
-            <a:endParaRPr lang="en-US" altLang="zh-CN" sz="1400" dirty="0">
-              <a:solidFill>
-                <a:schemeClr val="tx1"/>
-              </a:solidFill>
-              <a:sym typeface="+mn-ea"/>
-            </a:endParaRPr>
+              <a:t>Travel admin user16115</a:t>
+            </a:r>
           </a:p>
           <a:p>
             <a:pPr lvl="0" algn="ctr"/>
@@ -23594,28 +23421,13 @@
                 </a:solidFill>
                 <a:sym typeface="+mn-ea"/>
               </a:rPr>
-              <a:t>(</a:t>
-            </a:r>
-            <a:r>
-              <a:rPr lang="en-US" altLang="zh-CN" sz="1400" dirty="0" smtClean="0">
-                <a:solidFill>
-                  <a:schemeClr val="tx1"/>
-                </a:solidFill>
-                <a:sym typeface="+mn-ea"/>
-              </a:rPr>
-              <a:t>order16112, route16113, </a:t>
-            </a:r>
-            <a:endParaRPr lang="en-US" altLang="zh-CN" sz="1400" dirty="0">
-              <a:solidFill>
-                <a:schemeClr val="tx1"/>
-              </a:solidFill>
-              <a:sym typeface="+mn-ea"/>
-            </a:endParaRPr>
-          </a:p>
-          <a:p>
-            <a:pPr lvl="0" algn="ctr"/>
-            <a:r>
-              <a:rPr lang="en-US" altLang="zh-CN" sz="1400" dirty="0" smtClean="0">
+              <a:t>(order16112, route16113, </a:t>
+            </a:r>
+          </a:p>
+          <a:p>
+            <a:pPr lvl="0" algn="ctr"/>
+            <a:r>
+              <a:rPr lang="en-US" altLang="zh-CN" sz="1400" dirty="0">
                 <a:solidFill>
                   <a:schemeClr val="tx1"/>
                 </a:solidFill>
@@ -23623,12 +23435,6 @@
               </a:rPr>
               <a:t>Travel 16114,basic 18767)</a:t>
             </a:r>
-            <a:endParaRPr lang="en-US" altLang="zh-CN" sz="1400" dirty="0">
-              <a:solidFill>
-                <a:schemeClr val="tx1"/>
-              </a:solidFill>
-              <a:sym typeface="+mn-ea"/>
-            </a:endParaRPr>
           </a:p>
         </p:txBody>
       </p:sp>
@@ -23698,10 +23504,13 @@
                 </a:effectLst>
                 <a:sym typeface="+mn-ea"/>
               </a:rPr>
-              <a:t>Food </a:t>
-            </a:r>
-            <a:r>
-              <a:rPr lang="en-US" altLang="zh-CN" sz="1400" dirty="0" smtClean="0">
+              <a:t>Food service</a:t>
+            </a:r>
+          </a:p>
+          <a:p>
+            <a:pPr lvl="0" algn="ctr"/>
+            <a:r>
+              <a:rPr lang="en-US" altLang="zh-CN" sz="1400" dirty="0">
                 <a:ln w="0"/>
                 <a:solidFill>
                   <a:schemeClr val="tx1"/>
@@ -23715,13 +23524,139 @@
                 </a:effectLst>
                 <a:sym typeface="+mn-ea"/>
               </a:rPr>
-              <a:t>service</a:t>
-            </a:r>
-          </a:p>
-          <a:p>
-            <a:pPr lvl="0" algn="ctr"/>
-            <a:r>
-              <a:rPr lang="en-US" altLang="zh-CN" sz="1400" dirty="0" smtClean="0">
+              <a:t>18856</a:t>
+            </a:r>
+          </a:p>
+        </p:txBody>
+      </p:sp>
+      <p:sp>
+        <p:nvSpPr>
+          <p:cNvPr id="111" name="流程图: 准备 19"/>
+          <p:cNvSpPr/>
+          <p:nvPr/>
+        </p:nvSpPr>
+        <p:spPr>
+          <a:xfrm>
+            <a:off x="1406345" y="3745714"/>
+            <a:ext cx="854654" cy="418740"/>
+          </a:xfrm>
+          <a:prstGeom prst="flowChartPreparation">
+            <a:avLst/>
+          </a:prstGeom>
+          <a:solidFill>
+            <a:schemeClr val="bg1"/>
+          </a:solidFill>
+          <a:ln w="28575">
+            <a:solidFill>
+              <a:schemeClr val="tx1"/>
+            </a:solidFill>
+          </a:ln>
+          <a:effectLst>
+            <a:glow>
+              <a:schemeClr val="accent1">
+                <a:alpha val="40000"/>
+              </a:schemeClr>
+            </a:glow>
+          </a:effectLst>
+        </p:spPr>
+        <p:style>
+          <a:lnRef idx="1">
+            <a:schemeClr val="accent6"/>
+          </a:lnRef>
+          <a:fillRef idx="3">
+            <a:schemeClr val="accent6"/>
+          </a:fillRef>
+          <a:effectRef idx="2">
+            <a:schemeClr val="accent6"/>
+          </a:effectRef>
+          <a:fontRef idx="minor">
+            <a:schemeClr val="lt1"/>
+          </a:fontRef>
+        </p:style>
+        <p:txBody>
+          <a:bodyPr vertOverflow="overflow" horzOverflow="overflow" vert="horz" wrap="none" lIns="0" tIns="0" rIns="0" bIns="0" numCol="1" spcCol="0" rtlCol="0" fromWordArt="0" anchor="ctr" anchorCtr="0" forceAA="0" compatLnSpc="1">
+            <a:normAutofit lnSpcReduction="10000"/>
+          </a:bodyPr>
+          <a:lstStyle/>
+          <a:p>
+            <a:pPr lvl="0" algn="ctr"/>
+            <a:r>
+              <a:rPr lang="en-US" altLang="zh-CN" sz="1400" dirty="0">
+                <a:solidFill>
+                  <a:schemeClr val="tx1"/>
+                </a:solidFill>
+                <a:sym typeface="+mn-ea"/>
+              </a:rPr>
+              <a:t>Route</a:t>
+            </a:r>
+          </a:p>
+          <a:p>
+            <a:pPr lvl="0" algn="ctr"/>
+            <a:r>
+              <a:rPr lang="en-US" altLang="zh-CN" sz="1400" dirty="0">
+                <a:solidFill>
+                  <a:schemeClr val="tx1"/>
+                </a:solidFill>
+                <a:sym typeface="+mn-ea"/>
+              </a:rPr>
+              <a:t>11178</a:t>
+            </a:r>
+          </a:p>
+        </p:txBody>
+      </p:sp>
+      <p:sp>
+        <p:nvSpPr>
+          <p:cNvPr id="116" name="流程图: 准备 19"/>
+          <p:cNvSpPr/>
+          <p:nvPr/>
+        </p:nvSpPr>
+        <p:spPr>
+          <a:xfrm>
+            <a:off x="2476138" y="3706808"/>
+            <a:ext cx="734844" cy="409388"/>
+          </a:xfrm>
+          <a:prstGeom prst="flowChartPreparation">
+            <a:avLst/>
+          </a:prstGeom>
+          <a:solidFill>
+            <a:schemeClr val="bg1"/>
+          </a:solidFill>
+          <a:ln w="28575">
+            <a:solidFill>
+              <a:schemeClr val="tx1"/>
+            </a:solidFill>
+          </a:ln>
+          <a:effectLst>
+            <a:glow>
+              <a:schemeClr val="accent1">
+                <a:alpha val="40000"/>
+              </a:schemeClr>
+            </a:glow>
+          </a:effectLst>
+        </p:spPr>
+        <p:style>
+          <a:lnRef idx="1">
+            <a:schemeClr val="accent6"/>
+          </a:lnRef>
+          <a:fillRef idx="3">
+            <a:schemeClr val="accent6"/>
+          </a:fillRef>
+          <a:effectRef idx="2">
+            <a:schemeClr val="accent6"/>
+          </a:effectRef>
+          <a:fontRef idx="minor">
+            <a:schemeClr val="lt1"/>
+          </a:fontRef>
+        </p:style>
+        <p:txBody>
+          <a:bodyPr vertOverflow="overflow" horzOverflow="overflow" vert="horz" wrap="none" lIns="0" tIns="0" rIns="0" bIns="0" numCol="1" spcCol="0" rtlCol="0" fromWordArt="0" anchor="ctr" anchorCtr="0" forceAA="0" compatLnSpc="1">
+            <a:normAutofit lnSpcReduction="10000"/>
+          </a:bodyPr>
+          <a:lstStyle/>
+          <a:p>
+            <a:pPr lvl="0" algn="ctr"/>
+            <a:r>
+              <a:rPr lang="en-US" altLang="zh-CN" sz="1400" dirty="0">
                 <a:ln w="0"/>
                 <a:solidFill>
                   <a:schemeClr val="tx1"/>
@@ -23735,35 +23670,41 @@
                 </a:effectLst>
                 <a:sym typeface="+mn-ea"/>
               </a:rPr>
-              <a:t>18856</a:t>
-            </a:r>
-            <a:endParaRPr lang="en-US" altLang="zh-CN" sz="1400" dirty="0">
-              <a:ln w="0"/>
-              <a:solidFill>
-                <a:schemeClr val="tx1"/>
-              </a:solidFill>
-              <a:effectLst>
-                <a:outerShdw blurRad="38100" dist="19050" dir="2700000" algn="tl" rotWithShape="0">
-                  <a:schemeClr val="dk1">
-                    <a:alpha val="40000"/>
-                  </a:schemeClr>
-                </a:outerShdw>
-              </a:effectLst>
-              <a:sym typeface="+mn-ea"/>
-            </a:endParaRPr>
-          </a:p>
-        </p:txBody>
-      </p:sp>
-      <p:sp>
-        <p:nvSpPr>
-          <p:cNvPr id="111" name="流程图: 准备 19"/>
+              <a:t>Seat</a:t>
+            </a:r>
+          </a:p>
+          <a:p>
+            <a:pPr lvl="0" algn="ctr"/>
+            <a:r>
+              <a:rPr lang="en-US" altLang="zh-CN" sz="1400" dirty="0">
+                <a:ln w="0"/>
+                <a:solidFill>
+                  <a:schemeClr val="tx1"/>
+                </a:solidFill>
+                <a:effectLst>
+                  <a:outerShdw blurRad="38100" dist="19050" dir="2700000" algn="tl" rotWithShape="0">
+                    <a:schemeClr val="dk1">
+                      <a:alpha val="40000"/>
+                    </a:schemeClr>
+                  </a:outerShdw>
+                </a:effectLst>
+                <a:sym typeface="+mn-ea"/>
+              </a:rPr>
+              <a:t>18898</a:t>
+            </a:r>
+          </a:p>
+        </p:txBody>
+      </p:sp>
+      <p:sp>
+        <p:nvSpPr>
+          <p:cNvPr id="123" name="流程图: 准备 19"/>
           <p:cNvSpPr/>
           <p:nvPr/>
         </p:nvSpPr>
         <p:spPr>
           <a:xfrm>
-            <a:off x="1406345" y="3745714"/>
-            <a:ext cx="854654" cy="418740"/>
+            <a:off x="9982418" y="4468755"/>
+            <a:ext cx="887285" cy="660453"/>
           </a:xfrm>
           <a:prstGeom prst="flowChartPreparation">
             <a:avLst/>
@@ -23800,51 +23741,45 @@
         </p:style>
         <p:txBody>
           <a:bodyPr vertOverflow="overflow" horzOverflow="overflow" vert="horz" wrap="none" lIns="0" tIns="0" rIns="0" bIns="0" numCol="1" spcCol="0" rtlCol="0" fromWordArt="0" anchor="ctr" anchorCtr="0" forceAA="0" compatLnSpc="1">
-            <a:normAutofit lnSpcReduction="10000"/>
+            <a:normAutofit/>
           </a:bodyPr>
           <a:lstStyle/>
           <a:p>
             <a:pPr lvl="0" algn="ctr"/>
             <a:r>
-              <a:rPr lang="en-US" altLang="zh-CN" sz="1400" dirty="0" smtClean="0">
-                <a:solidFill>
-                  <a:schemeClr val="tx1"/>
-                </a:solidFill>
-                <a:sym typeface="+mn-ea"/>
-              </a:rPr>
-              <a:t>Route</a:t>
-            </a:r>
-          </a:p>
-          <a:p>
-            <a:pPr lvl="0" algn="ctr"/>
-            <a:r>
-              <a:rPr lang="en-US" altLang="zh-CN" sz="1400" dirty="0" smtClean="0">
-                <a:solidFill>
-                  <a:schemeClr val="tx1"/>
-                </a:solidFill>
-                <a:sym typeface="+mn-ea"/>
-              </a:rPr>
-              <a:t>11178</a:t>
-            </a:r>
-            <a:endParaRPr lang="en-US" altLang="zh-CN" sz="1400" dirty="0">
-              <a:solidFill>
-                <a:schemeClr val="tx1"/>
-              </a:solidFill>
-              <a:sym typeface="+mn-ea"/>
-            </a:endParaRPr>
-          </a:p>
-        </p:txBody>
-      </p:sp>
-      <p:sp>
-        <p:nvSpPr>
-          <p:cNvPr id="116" name="流程图: 准备 19"/>
+              <a:rPr lang="en-US" altLang="zh-CN" sz="1400" dirty="0">
+                <a:solidFill>
+                  <a:schemeClr val="tx1"/>
+                </a:solidFill>
+                <a:sym typeface="+mn-ea"/>
+              </a:rPr>
+              <a:t>Assurance</a:t>
+            </a:r>
+          </a:p>
+          <a:p>
+            <a:pPr lvl="0" algn="ctr"/>
+            <a:r>
+              <a:rPr lang="en-US" altLang="zh-CN" sz="1400" dirty="0">
+                <a:solidFill>
+                  <a:schemeClr val="tx1"/>
+                </a:solidFill>
+                <a:sym typeface="+mn-ea"/>
+              </a:rPr>
+              <a:t>18888</a:t>
+            </a:r>
+          </a:p>
+        </p:txBody>
+      </p:sp>
+      <p:sp>
+        <p:nvSpPr>
+          <p:cNvPr id="63" name="流程图: 准备 19"/>
           <p:cNvSpPr/>
           <p:nvPr/>
         </p:nvSpPr>
         <p:spPr>
           <a:xfrm>
-            <a:off x="2476138" y="3706808"/>
-            <a:ext cx="734844" cy="409388"/>
+            <a:off x="8754669" y="1339657"/>
+            <a:ext cx="908050" cy="368300"/>
           </a:xfrm>
           <a:prstGeom prst="flowChartPreparation">
             <a:avLst/>
@@ -23881,13 +23816,668 @@
         </p:style>
         <p:txBody>
           <a:bodyPr vertOverflow="overflow" horzOverflow="overflow" vert="horz" wrap="none" lIns="0" tIns="0" rIns="0" bIns="0" numCol="1" spcCol="0" rtlCol="0" fromWordArt="0" anchor="ctr" anchorCtr="0" forceAA="0" compatLnSpc="1">
+            <a:normAutofit fontScale="92500" lnSpcReduction="10000"/>
+          </a:bodyPr>
+          <a:lstStyle/>
+          <a:p>
+            <a:pPr lvl="0" algn="ctr"/>
+            <a:r>
+              <a:rPr lang="en-US" altLang="zh-CN" sz="1400" dirty="0">
+                <a:solidFill>
+                  <a:schemeClr val="tx1"/>
+                </a:solidFill>
+                <a:sym typeface="+mn-ea"/>
+              </a:rPr>
+              <a:t>News</a:t>
+            </a:r>
+          </a:p>
+          <a:p>
+            <a:pPr lvl="0" algn="ctr"/>
+            <a:r>
+              <a:rPr lang="en-US" altLang="zh-CN" sz="1400" dirty="0">
+                <a:solidFill>
+                  <a:schemeClr val="tx1"/>
+                </a:solidFill>
+                <a:sym typeface="+mn-ea"/>
+              </a:rPr>
+              <a:t>12862</a:t>
+            </a:r>
+          </a:p>
+        </p:txBody>
+      </p:sp>
+      <p:cxnSp>
+        <p:nvCxnSpPr>
+          <p:cNvPr id="65" name="肘形连接符 33"/>
+          <p:cNvCxnSpPr>
+            <a:stCxn id="107" idx="2"/>
+            <a:endCxn id="63" idx="0"/>
+          </p:cNvCxnSpPr>
+          <p:nvPr/>
+        </p:nvCxnSpPr>
+        <p:spPr>
+          <a:xfrm rot="16200000" flipH="1">
+            <a:off x="7259811" y="-609227"/>
+            <a:ext cx="592581" cy="3305185"/>
+          </a:xfrm>
+          <a:prstGeom prst="bentConnector3">
+            <a:avLst>
+              <a:gd name="adj1" fmla="val 37141"/>
+            </a:avLst>
+          </a:prstGeom>
+          <a:ln w="19050">
+            <a:solidFill>
+              <a:schemeClr val="tx1"/>
+            </a:solidFill>
+            <a:tailEnd type="arrow"/>
+          </a:ln>
+        </p:spPr>
+        <p:style>
+          <a:lnRef idx="1">
+            <a:schemeClr val="accent1"/>
+          </a:lnRef>
+          <a:fillRef idx="0">
+            <a:schemeClr val="accent1"/>
+          </a:fillRef>
+          <a:effectRef idx="0">
+            <a:schemeClr val="accent1"/>
+          </a:effectRef>
+          <a:fontRef idx="minor">
+            <a:schemeClr val="tx1"/>
+          </a:fontRef>
+        </p:style>
+      </p:cxnSp>
+      <p:sp>
+        <p:nvSpPr>
+          <p:cNvPr id="77" name="流程图: 准备 19"/>
+          <p:cNvSpPr/>
+          <p:nvPr/>
+        </p:nvSpPr>
+        <p:spPr>
+          <a:xfrm>
+            <a:off x="448353" y="1130389"/>
+            <a:ext cx="2012209" cy="726757"/>
+          </a:xfrm>
+          <a:prstGeom prst="flowChartPreparation">
+            <a:avLst/>
+          </a:prstGeom>
+          <a:solidFill>
+            <a:schemeClr val="bg1"/>
+          </a:solidFill>
+          <a:ln w="28575">
+            <a:solidFill>
+              <a:schemeClr val="tx1"/>
+            </a:solidFill>
+          </a:ln>
+          <a:effectLst>
+            <a:glow>
+              <a:schemeClr val="accent1">
+                <a:alpha val="40000"/>
+              </a:schemeClr>
+            </a:glow>
+          </a:effectLst>
+        </p:spPr>
+        <p:style>
+          <a:lnRef idx="1">
+            <a:schemeClr val="accent6"/>
+          </a:lnRef>
+          <a:fillRef idx="3">
+            <a:schemeClr val="accent6"/>
+          </a:fillRef>
+          <a:effectRef idx="2">
+            <a:schemeClr val="accent6"/>
+          </a:effectRef>
+          <a:fontRef idx="minor">
+            <a:schemeClr val="lt1"/>
+          </a:fontRef>
+        </p:style>
+        <p:txBody>
+          <a:bodyPr vertOverflow="overflow" horzOverflow="overflow" vert="horz" wrap="none" lIns="0" tIns="0" rIns="0" bIns="0" numCol="1" spcCol="0" rtlCol="0" fromWordArt="0" anchor="ctr" anchorCtr="0" forceAA="0" compatLnSpc="1">
             <a:normAutofit lnSpcReduction="10000"/>
           </a:bodyPr>
           <a:lstStyle/>
           <a:p>
             <a:pPr lvl="0" algn="ctr"/>
             <a:r>
-              <a:rPr lang="en-US" altLang="zh-CN" sz="1400" dirty="0" smtClean="0">
+              <a:rPr lang="en-US" altLang="zh-CN" sz="1600" dirty="0">
+                <a:solidFill>
+                  <a:schemeClr val="tx1"/>
+                </a:solidFill>
+                <a:sym typeface="+mn-ea"/>
+              </a:rPr>
+              <a:t>Advanced travel plan</a:t>
+            </a:r>
+          </a:p>
+          <a:p>
+            <a:pPr lvl="0" algn="ctr"/>
+            <a:r>
+              <a:rPr lang="en-US" altLang="zh-CN" sz="1600" dirty="0">
+                <a:solidFill>
+                  <a:schemeClr val="tx1"/>
+                </a:solidFill>
+                <a:sym typeface="+mn-ea"/>
+              </a:rPr>
+              <a:t>14322</a:t>
+            </a:r>
+          </a:p>
+          <a:p>
+            <a:pPr lvl="0" algn="ctr"/>
+            <a:r>
+              <a:rPr lang="en-US" altLang="zh-CN" sz="1600" dirty="0">
+                <a:solidFill>
+                  <a:schemeClr val="tx1"/>
+                </a:solidFill>
+                <a:sym typeface="+mn-ea"/>
+              </a:rPr>
+              <a:t>(route info + ticket)</a:t>
+            </a:r>
+          </a:p>
+        </p:txBody>
+      </p:sp>
+      <p:sp>
+        <p:nvSpPr>
+          <p:cNvPr id="30" name="流程图: 准备 19"/>
+          <p:cNvSpPr/>
+          <p:nvPr/>
+        </p:nvSpPr>
+        <p:spPr>
+          <a:xfrm>
+            <a:off x="247290" y="2331969"/>
+            <a:ext cx="2414334" cy="572256"/>
+          </a:xfrm>
+          <a:prstGeom prst="flowChartPreparation">
+            <a:avLst/>
+          </a:prstGeom>
+          <a:solidFill>
+            <a:schemeClr val="bg1"/>
+          </a:solidFill>
+          <a:ln w="28575">
+            <a:solidFill>
+              <a:schemeClr val="tx1"/>
+            </a:solidFill>
+          </a:ln>
+          <a:effectLst>
+            <a:glow>
+              <a:schemeClr val="accent1">
+                <a:alpha val="40000"/>
+              </a:schemeClr>
+            </a:glow>
+          </a:effectLst>
+        </p:spPr>
+        <p:style>
+          <a:lnRef idx="1">
+            <a:schemeClr val="accent6"/>
+          </a:lnRef>
+          <a:fillRef idx="3">
+            <a:schemeClr val="accent6"/>
+          </a:fillRef>
+          <a:effectRef idx="2">
+            <a:schemeClr val="accent6"/>
+          </a:effectRef>
+          <a:fontRef idx="minor">
+            <a:schemeClr val="lt1"/>
+          </a:fontRef>
+        </p:style>
+        <p:txBody>
+          <a:bodyPr vertOverflow="overflow" horzOverflow="overflow" vert="horz" wrap="none" lIns="0" tIns="0" rIns="0" bIns="0" numCol="1" spcCol="0" rtlCol="0" fromWordArt="0" anchor="ctr" anchorCtr="0" forceAA="0" compatLnSpc="1">
+            <a:normAutofit/>
+          </a:bodyPr>
+          <a:lstStyle/>
+          <a:p>
+            <a:pPr lvl="0" algn="ctr"/>
+            <a:r>
+              <a:rPr lang="en-US" altLang="zh-CN" sz="1600" dirty="0">
+                <a:solidFill>
+                  <a:schemeClr val="tx1"/>
+                </a:solidFill>
+                <a:sym typeface="+mn-ea"/>
+              </a:rPr>
+              <a:t>route plan 14578</a:t>
+            </a:r>
+          </a:p>
+          <a:p>
+            <a:pPr lvl="0" algn="ctr"/>
+            <a:r>
+              <a:rPr lang="en-US" altLang="zh-CN" sz="1600" dirty="0">
+                <a:solidFill>
+                  <a:schemeClr val="tx1"/>
+                </a:solidFill>
+                <a:sym typeface="+mn-ea"/>
+              </a:rPr>
+              <a:t>(price, change, time)</a:t>
+            </a:r>
+          </a:p>
+        </p:txBody>
+      </p:sp>
+      <p:sp>
+        <p:nvSpPr>
+          <p:cNvPr id="31" name="流程图: 准备 19"/>
+          <p:cNvSpPr/>
+          <p:nvPr/>
+        </p:nvSpPr>
+        <p:spPr>
+          <a:xfrm>
+            <a:off x="9889809" y="1278087"/>
+            <a:ext cx="1072505" cy="442999"/>
+          </a:xfrm>
+          <a:prstGeom prst="flowChartPreparation">
+            <a:avLst/>
+          </a:prstGeom>
+          <a:solidFill>
+            <a:schemeClr val="bg1"/>
+          </a:solidFill>
+          <a:ln w="28575">
+            <a:solidFill>
+              <a:schemeClr val="tx1"/>
+            </a:solidFill>
+          </a:ln>
+          <a:effectLst>
+            <a:glow>
+              <a:schemeClr val="accent1">
+                <a:alpha val="40000"/>
+              </a:schemeClr>
+            </a:glow>
+          </a:effectLst>
+        </p:spPr>
+        <p:style>
+          <a:lnRef idx="1">
+            <a:schemeClr val="accent6"/>
+          </a:lnRef>
+          <a:fillRef idx="3">
+            <a:schemeClr val="accent6"/>
+          </a:fillRef>
+          <a:effectRef idx="2">
+            <a:schemeClr val="accent6"/>
+          </a:effectRef>
+          <a:fontRef idx="minor">
+            <a:schemeClr val="lt1"/>
+          </a:fontRef>
+        </p:style>
+        <p:txBody>
+          <a:bodyPr vertOverflow="overflow" horzOverflow="overflow" vert="horz" wrap="none" lIns="0" tIns="0" rIns="0" bIns="0" numCol="1" spcCol="0" rtlCol="0" fromWordArt="0" anchor="ctr" anchorCtr="0" forceAA="0" compatLnSpc="1">
+            <a:normAutofit/>
+          </a:bodyPr>
+          <a:lstStyle/>
+          <a:p>
+            <a:pPr lvl="0" algn="ctr"/>
+            <a:r>
+              <a:rPr lang="en-US" altLang="zh-CN" sz="1400" dirty="0">
+                <a:solidFill>
+                  <a:schemeClr val="tx1"/>
+                </a:solidFill>
+                <a:sym typeface="+mn-ea"/>
+              </a:rPr>
+              <a:t>ticket office</a:t>
+            </a:r>
+          </a:p>
+          <a:p>
+            <a:pPr lvl="0" algn="ctr"/>
+            <a:r>
+              <a:rPr lang="en-US" altLang="zh-CN" sz="1400" dirty="0">
+                <a:solidFill>
+                  <a:schemeClr val="tx1"/>
+                </a:solidFill>
+                <a:sym typeface="+mn-ea"/>
+              </a:rPr>
+              <a:t>16108</a:t>
+            </a:r>
+          </a:p>
+        </p:txBody>
+      </p:sp>
+      <p:cxnSp>
+        <p:nvCxnSpPr>
+          <p:cNvPr id="32" name="肘形连接符 33"/>
+          <p:cNvCxnSpPr>
+            <a:stCxn id="107" idx="2"/>
+            <a:endCxn id="31" idx="0"/>
+          </p:cNvCxnSpPr>
+          <p:nvPr/>
+        </p:nvCxnSpPr>
+        <p:spPr>
+          <a:xfrm rot="16200000" flipH="1">
+            <a:off x="7899280" y="-1248696"/>
+            <a:ext cx="531011" cy="4522553"/>
+          </a:xfrm>
+          <a:prstGeom prst="bentConnector3">
+            <a:avLst>
+              <a:gd name="adj1" fmla="val 41390"/>
+            </a:avLst>
+          </a:prstGeom>
+          <a:ln w="19050">
+            <a:solidFill>
+              <a:schemeClr val="tx1"/>
+            </a:solidFill>
+            <a:tailEnd type="arrow"/>
+          </a:ln>
+        </p:spPr>
+        <p:style>
+          <a:lnRef idx="1">
+            <a:schemeClr val="accent1"/>
+          </a:lnRef>
+          <a:fillRef idx="0">
+            <a:schemeClr val="accent1"/>
+          </a:fillRef>
+          <a:effectRef idx="0">
+            <a:schemeClr val="accent1"/>
+          </a:effectRef>
+          <a:fontRef idx="minor">
+            <a:schemeClr val="tx1"/>
+          </a:fontRef>
+        </p:style>
+      </p:cxnSp>
+      <p:sp>
+        <p:nvSpPr>
+          <p:cNvPr id="33" name="流程图: 准备 19"/>
+          <p:cNvSpPr/>
+          <p:nvPr/>
+        </p:nvSpPr>
+        <p:spPr>
+          <a:xfrm>
+            <a:off x="9876704" y="2395305"/>
+            <a:ext cx="1053465" cy="513080"/>
+          </a:xfrm>
+          <a:prstGeom prst="flowChartPreparation">
+            <a:avLst/>
+          </a:prstGeom>
+          <a:solidFill>
+            <a:schemeClr val="bg1"/>
+          </a:solidFill>
+          <a:ln w="28575">
+            <a:solidFill>
+              <a:schemeClr val="tx1"/>
+            </a:solidFill>
+          </a:ln>
+          <a:effectLst>
+            <a:glow>
+              <a:schemeClr val="accent1">
+                <a:alpha val="40000"/>
+              </a:schemeClr>
+            </a:glow>
+          </a:effectLst>
+        </p:spPr>
+        <p:style>
+          <a:lnRef idx="1">
+            <a:schemeClr val="accent6"/>
+          </a:lnRef>
+          <a:fillRef idx="3">
+            <a:schemeClr val="accent6"/>
+          </a:fillRef>
+          <a:effectRef idx="2">
+            <a:schemeClr val="accent6"/>
+          </a:effectRef>
+          <a:fontRef idx="minor">
+            <a:schemeClr val="lt1"/>
+          </a:fontRef>
+        </p:style>
+        <p:txBody>
+          <a:bodyPr vertOverflow="overflow" horzOverflow="overflow" vert="horz" wrap="none" lIns="0" tIns="0" rIns="0" bIns="0" numCol="1" spcCol="0" rtlCol="0" fromWordArt="0" anchor="ctr" anchorCtr="0" forceAA="0" compatLnSpc="1">
+            <a:normAutofit/>
+          </a:bodyPr>
+          <a:lstStyle/>
+          <a:p>
+            <a:pPr lvl="0" algn="ctr"/>
+            <a:r>
+              <a:rPr lang="en-US" altLang="zh-CN" sz="1400" dirty="0">
+                <a:solidFill>
+                  <a:schemeClr val="tx1"/>
+                </a:solidFill>
+                <a:sym typeface="+mn-ea"/>
+              </a:rPr>
+              <a:t>Consign</a:t>
+            </a:r>
+          </a:p>
+          <a:p>
+            <a:pPr lvl="0" algn="ctr"/>
+            <a:r>
+              <a:rPr lang="en-US" altLang="zh-CN" sz="1400" dirty="0">
+                <a:solidFill>
+                  <a:schemeClr val="tx1"/>
+                </a:solidFill>
+                <a:sym typeface="+mn-ea"/>
+              </a:rPr>
+              <a:t>16111</a:t>
+            </a:r>
+          </a:p>
+        </p:txBody>
+      </p:sp>
+      <p:sp>
+        <p:nvSpPr>
+          <p:cNvPr id="37" name="流程图: 准备 19"/>
+          <p:cNvSpPr/>
+          <p:nvPr/>
+        </p:nvSpPr>
+        <p:spPr>
+          <a:xfrm>
+            <a:off x="9809393" y="3473801"/>
+            <a:ext cx="1188085" cy="513080"/>
+          </a:xfrm>
+          <a:prstGeom prst="flowChartPreparation">
+            <a:avLst/>
+          </a:prstGeom>
+          <a:solidFill>
+            <a:schemeClr val="bg1"/>
+          </a:solidFill>
+          <a:ln w="28575">
+            <a:solidFill>
+              <a:schemeClr val="tx1"/>
+            </a:solidFill>
+          </a:ln>
+          <a:effectLst>
+            <a:glow>
+              <a:schemeClr val="accent1">
+                <a:alpha val="40000"/>
+              </a:schemeClr>
+            </a:glow>
+          </a:effectLst>
+        </p:spPr>
+        <p:style>
+          <a:lnRef idx="1">
+            <a:schemeClr val="accent6"/>
+          </a:lnRef>
+          <a:fillRef idx="3">
+            <a:schemeClr val="accent6"/>
+          </a:fillRef>
+          <a:effectRef idx="2">
+            <a:schemeClr val="accent6"/>
+          </a:effectRef>
+          <a:fontRef idx="minor">
+            <a:schemeClr val="lt1"/>
+          </a:fontRef>
+        </p:style>
+        <p:txBody>
+          <a:bodyPr vertOverflow="overflow" horzOverflow="overflow" vert="horz" wrap="none" lIns="0" tIns="0" rIns="0" bIns="0" numCol="1" spcCol="0" rtlCol="0" fromWordArt="0" anchor="ctr" anchorCtr="0" forceAA="0" compatLnSpc="1">
+            <a:normAutofit/>
+          </a:bodyPr>
+          <a:lstStyle/>
+          <a:p>
+            <a:pPr lvl="0" algn="ctr"/>
+            <a:r>
+              <a:rPr lang="en-US" altLang="zh-CN" sz="1400" dirty="0">
+                <a:solidFill>
+                  <a:schemeClr val="tx1"/>
+                </a:solidFill>
+                <a:sym typeface="+mn-ea"/>
+              </a:rPr>
+              <a:t>consign price</a:t>
+            </a:r>
+          </a:p>
+          <a:p>
+            <a:pPr lvl="0" algn="ctr"/>
+            <a:r>
+              <a:rPr lang="en-US" altLang="zh-CN" sz="1400" dirty="0">
+                <a:solidFill>
+                  <a:schemeClr val="tx1"/>
+                </a:solidFill>
+                <a:sym typeface="+mn-ea"/>
+              </a:rPr>
+              <a:t>16110</a:t>
+            </a:r>
+          </a:p>
+        </p:txBody>
+      </p:sp>
+      <p:cxnSp>
+        <p:nvCxnSpPr>
+          <p:cNvPr id="39" name="Straight Arrow Connector 78"/>
+          <p:cNvCxnSpPr>
+            <a:stCxn id="33" idx="2"/>
+            <a:endCxn id="37" idx="0"/>
+          </p:cNvCxnSpPr>
+          <p:nvPr/>
+        </p:nvCxnSpPr>
+        <p:spPr>
+          <a:xfrm flipH="1">
+            <a:off x="10403436" y="2908385"/>
+            <a:ext cx="1" cy="565416"/>
+          </a:xfrm>
+          <a:prstGeom prst="straightConnector1">
+            <a:avLst/>
+          </a:prstGeom>
+          <a:ln>
+            <a:tailEnd type="arrow" w="lg" len="lg"/>
+          </a:ln>
+        </p:spPr>
+        <p:style>
+          <a:lnRef idx="1">
+            <a:schemeClr val="accent1"/>
+          </a:lnRef>
+          <a:fillRef idx="0">
+            <a:schemeClr val="accent1"/>
+          </a:fillRef>
+          <a:effectRef idx="0">
+            <a:schemeClr val="accent1"/>
+          </a:effectRef>
+          <a:fontRef idx="minor">
+            <a:schemeClr val="tx1"/>
+          </a:fontRef>
+        </p:style>
+      </p:cxnSp>
+      <p:sp>
+        <p:nvSpPr>
+          <p:cNvPr id="42" name="流程图: 准备 19"/>
+          <p:cNvSpPr/>
+          <p:nvPr/>
+        </p:nvSpPr>
+        <p:spPr>
+          <a:xfrm>
+            <a:off x="3427326" y="3642933"/>
+            <a:ext cx="1053465" cy="513080"/>
+          </a:xfrm>
+          <a:prstGeom prst="flowChartPreparation">
+            <a:avLst/>
+          </a:prstGeom>
+          <a:solidFill>
+            <a:schemeClr val="bg1"/>
+          </a:solidFill>
+          <a:ln w="28575">
+            <a:solidFill>
+              <a:schemeClr val="tx1"/>
+            </a:solidFill>
+          </a:ln>
+          <a:effectLst>
+            <a:glow>
+              <a:schemeClr val="accent1">
+                <a:alpha val="40000"/>
+              </a:schemeClr>
+            </a:glow>
+          </a:effectLst>
+        </p:spPr>
+        <p:style>
+          <a:lnRef idx="1">
+            <a:schemeClr val="accent6"/>
+          </a:lnRef>
+          <a:fillRef idx="3">
+            <a:schemeClr val="accent6"/>
+          </a:fillRef>
+          <a:effectRef idx="2">
+            <a:schemeClr val="accent6"/>
+          </a:effectRef>
+          <a:fontRef idx="minor">
+            <a:schemeClr val="lt1"/>
+          </a:fontRef>
+        </p:style>
+        <p:txBody>
+          <a:bodyPr vertOverflow="overflow" horzOverflow="overflow" vert="horz" wrap="none" lIns="0" tIns="0" rIns="0" bIns="0" numCol="1" spcCol="0" rtlCol="0" fromWordArt="0" anchor="ctr" anchorCtr="0" forceAA="0" compatLnSpc="1">
+            <a:normAutofit/>
+          </a:bodyPr>
+          <a:lstStyle/>
+          <a:p>
+            <a:pPr lvl="0" algn="ctr"/>
+            <a:r>
+              <a:rPr lang="en-US" altLang="zh-CN" sz="1400" dirty="0">
+                <a:solidFill>
+                  <a:schemeClr val="tx1"/>
+                </a:solidFill>
+                <a:sym typeface="+mn-ea"/>
+              </a:rPr>
+              <a:t>Voucher</a:t>
+            </a:r>
+          </a:p>
+          <a:p>
+            <a:pPr lvl="0" algn="ctr"/>
+            <a:r>
+              <a:rPr lang="en-US" altLang="zh-CN" sz="1400" dirty="0">
+                <a:solidFill>
+                  <a:schemeClr val="tx1"/>
+                </a:solidFill>
+                <a:sym typeface="+mn-ea"/>
+              </a:rPr>
+              <a:t>16101</a:t>
+            </a:r>
+          </a:p>
+        </p:txBody>
+      </p:sp>
+      <p:sp>
+        <p:nvSpPr>
+          <p:cNvPr id="73" name="流程图: 准备 19"/>
+          <p:cNvSpPr/>
+          <p:nvPr/>
+        </p:nvSpPr>
+        <p:spPr>
+          <a:xfrm>
+            <a:off x="1373338" y="5386499"/>
+            <a:ext cx="1061083" cy="484319"/>
+          </a:xfrm>
+          <a:prstGeom prst="flowChartPreparation">
+            <a:avLst/>
+          </a:prstGeom>
+          <a:solidFill>
+            <a:schemeClr val="bg1"/>
+          </a:solidFill>
+          <a:ln w="28575">
+            <a:solidFill>
+              <a:schemeClr val="tx1"/>
+            </a:solidFill>
+          </a:ln>
+          <a:effectLst>
+            <a:glow>
+              <a:schemeClr val="accent1">
+                <a:alpha val="40000"/>
+              </a:schemeClr>
+            </a:glow>
+          </a:effectLst>
+        </p:spPr>
+        <p:style>
+          <a:lnRef idx="1">
+            <a:schemeClr val="accent6"/>
+          </a:lnRef>
+          <a:fillRef idx="3">
+            <a:schemeClr val="accent6"/>
+          </a:fillRef>
+          <a:effectRef idx="2">
+            <a:schemeClr val="accent6"/>
+          </a:effectRef>
+          <a:fontRef idx="minor">
+            <a:schemeClr val="lt1"/>
+          </a:fontRef>
+        </p:style>
+        <p:txBody>
+          <a:bodyPr vertOverflow="overflow" horzOverflow="overflow" vert="horz" wrap="none" lIns="0" tIns="0" rIns="0" bIns="0" numCol="1" spcCol="0" rtlCol="0" fromWordArt="0" anchor="ctr" anchorCtr="0" forceAA="0" compatLnSpc="1">
+            <a:normAutofit/>
+          </a:bodyPr>
+          <a:lstStyle/>
+          <a:p>
+            <a:pPr lvl="0" algn="ctr"/>
+            <a:r>
+              <a:rPr lang="en-US" altLang="zh-CN" sz="1400" dirty="0">
                 <a:ln w="0"/>
                 <a:solidFill>
                   <a:schemeClr val="tx1"/>
@@ -23901,13 +24491,13 @@
                 </a:effectLst>
                 <a:sym typeface="+mn-ea"/>
               </a:rPr>
-              <a:t>Seat</a:t>
-            </a:r>
-          </a:p>
-          <a:p>
-            <a:pPr lvl="0" algn="ctr"/>
-            <a:r>
-              <a:rPr lang="en-US" altLang="zh-CN" sz="1400" dirty="0" smtClean="0">
+              <a:t>Food map</a:t>
+            </a:r>
+          </a:p>
+          <a:p>
+            <a:pPr lvl="0" algn="ctr"/>
+            <a:r>
+              <a:rPr lang="en-US" altLang="zh-CN" sz="1400" dirty="0">
                 <a:ln w="0"/>
                 <a:solidFill>
                   <a:schemeClr val="tx1"/>
@@ -23921,958 +24511,8 @@
                 </a:effectLst>
                 <a:sym typeface="+mn-ea"/>
               </a:rPr>
-              <a:t>18898</a:t>
-            </a:r>
-            <a:endParaRPr lang="en-US" altLang="zh-CN" sz="1400" dirty="0">
-              <a:ln w="0"/>
-              <a:solidFill>
-                <a:schemeClr val="tx1"/>
-              </a:solidFill>
-              <a:effectLst>
-                <a:outerShdw blurRad="38100" dist="19050" dir="2700000" algn="tl" rotWithShape="0">
-                  <a:schemeClr val="dk1">
-                    <a:alpha val="40000"/>
-                  </a:schemeClr>
-                </a:outerShdw>
-              </a:effectLst>
-              <a:sym typeface="+mn-ea"/>
-            </a:endParaRPr>
-          </a:p>
-        </p:txBody>
-      </p:sp>
-      <p:sp>
-        <p:nvSpPr>
-          <p:cNvPr id="123" name="流程图: 准备 19"/>
-          <p:cNvSpPr/>
-          <p:nvPr/>
-        </p:nvSpPr>
-        <p:spPr>
-          <a:xfrm>
-            <a:off x="9982418" y="4468755"/>
-            <a:ext cx="887285" cy="660453"/>
-          </a:xfrm>
-          <a:prstGeom prst="flowChartPreparation">
-            <a:avLst/>
-          </a:prstGeom>
-          <a:solidFill>
-            <a:schemeClr val="bg1"/>
-          </a:solidFill>
-          <a:ln w="28575">
-            <a:solidFill>
-              <a:schemeClr val="tx1"/>
-            </a:solidFill>
-          </a:ln>
-          <a:effectLst>
-            <a:glow>
-              <a:schemeClr val="accent1">
-                <a:alpha val="40000"/>
-              </a:schemeClr>
-            </a:glow>
-          </a:effectLst>
-        </p:spPr>
-        <p:style>
-          <a:lnRef idx="1">
-            <a:schemeClr val="accent6"/>
-          </a:lnRef>
-          <a:fillRef idx="3">
-            <a:schemeClr val="accent6"/>
-          </a:fillRef>
-          <a:effectRef idx="2">
-            <a:schemeClr val="accent6"/>
-          </a:effectRef>
-          <a:fontRef idx="minor">
-            <a:schemeClr val="lt1"/>
-          </a:fontRef>
-        </p:style>
-        <p:txBody>
-          <a:bodyPr vertOverflow="overflow" horzOverflow="overflow" vert="horz" wrap="none" lIns="0" tIns="0" rIns="0" bIns="0" numCol="1" spcCol="0" rtlCol="0" fromWordArt="0" anchor="ctr" anchorCtr="0" forceAA="0" compatLnSpc="1">
-            <a:normAutofit/>
-          </a:bodyPr>
-          <a:lstStyle/>
-          <a:p>
-            <a:pPr lvl="0" algn="ctr"/>
-            <a:r>
-              <a:rPr lang="en-US" altLang="zh-CN" sz="1400" dirty="0" smtClean="0">
-                <a:solidFill>
-                  <a:schemeClr val="tx1"/>
-                </a:solidFill>
-                <a:sym typeface="+mn-ea"/>
-              </a:rPr>
-              <a:t>Assurance</a:t>
-            </a:r>
-          </a:p>
-          <a:p>
-            <a:pPr lvl="0" algn="ctr"/>
-            <a:r>
-              <a:rPr lang="en-US" altLang="zh-CN" sz="1400" dirty="0" smtClean="0">
-                <a:solidFill>
-                  <a:schemeClr val="tx1"/>
-                </a:solidFill>
-                <a:sym typeface="+mn-ea"/>
-              </a:rPr>
-              <a:t>18888</a:t>
-            </a:r>
-            <a:endParaRPr lang="en-US" altLang="zh-CN" sz="1400" dirty="0">
-              <a:solidFill>
-                <a:schemeClr val="tx1"/>
-              </a:solidFill>
-              <a:sym typeface="+mn-ea"/>
-            </a:endParaRPr>
-          </a:p>
-        </p:txBody>
-      </p:sp>
-      <p:sp>
-        <p:nvSpPr>
-          <p:cNvPr id="63" name="流程图: 准备 19"/>
-          <p:cNvSpPr/>
-          <p:nvPr/>
-        </p:nvSpPr>
-        <p:spPr>
-          <a:xfrm>
-            <a:off x="8754669" y="1339657"/>
-            <a:ext cx="908050" cy="368300"/>
-          </a:xfrm>
-          <a:prstGeom prst="flowChartPreparation">
-            <a:avLst/>
-          </a:prstGeom>
-          <a:solidFill>
-            <a:schemeClr val="bg1"/>
-          </a:solidFill>
-          <a:ln w="28575">
-            <a:solidFill>
-              <a:schemeClr val="tx1"/>
-            </a:solidFill>
-          </a:ln>
-          <a:effectLst>
-            <a:glow>
-              <a:schemeClr val="accent1">
-                <a:alpha val="40000"/>
-              </a:schemeClr>
-            </a:glow>
-          </a:effectLst>
-        </p:spPr>
-        <p:style>
-          <a:lnRef idx="1">
-            <a:schemeClr val="accent6"/>
-          </a:lnRef>
-          <a:fillRef idx="3">
-            <a:schemeClr val="accent6"/>
-          </a:fillRef>
-          <a:effectRef idx="2">
-            <a:schemeClr val="accent6"/>
-          </a:effectRef>
-          <a:fontRef idx="minor">
-            <a:schemeClr val="lt1"/>
-          </a:fontRef>
-        </p:style>
-        <p:txBody>
-          <a:bodyPr vertOverflow="overflow" horzOverflow="overflow" vert="horz" wrap="none" lIns="0" tIns="0" rIns="0" bIns="0" numCol="1" spcCol="0" rtlCol="0" fromWordArt="0" anchor="ctr" anchorCtr="0" forceAA="0" compatLnSpc="1">
-            <a:normAutofit fontScale="92500" lnSpcReduction="10000"/>
-          </a:bodyPr>
-          <a:lstStyle/>
-          <a:p>
-            <a:pPr lvl="0" algn="ctr"/>
-            <a:r>
-              <a:rPr lang="en-US" altLang="zh-CN" sz="1400" dirty="0" smtClean="0">
-                <a:solidFill>
-                  <a:schemeClr val="tx1"/>
-                </a:solidFill>
-                <a:sym typeface="+mn-ea"/>
-              </a:rPr>
-              <a:t>News</a:t>
-            </a:r>
-          </a:p>
-          <a:p>
-            <a:pPr lvl="0" algn="ctr"/>
-            <a:r>
-              <a:rPr lang="en-US" altLang="zh-CN" sz="1400" dirty="0" smtClean="0">
-                <a:solidFill>
-                  <a:schemeClr val="tx1"/>
-                </a:solidFill>
-                <a:sym typeface="+mn-ea"/>
-              </a:rPr>
-              <a:t>12862</a:t>
-            </a:r>
-            <a:endParaRPr lang="en-US" altLang="zh-CN" sz="1400" dirty="0">
-              <a:solidFill>
-                <a:schemeClr val="tx1"/>
-              </a:solidFill>
-              <a:sym typeface="+mn-ea"/>
-            </a:endParaRPr>
-          </a:p>
-        </p:txBody>
-      </p:sp>
-      <p:cxnSp>
-        <p:nvCxnSpPr>
-          <p:cNvPr id="65" name="肘形连接符 33"/>
-          <p:cNvCxnSpPr>
-            <a:stCxn id="107" idx="2"/>
-            <a:endCxn id="63" idx="0"/>
-          </p:cNvCxnSpPr>
-          <p:nvPr/>
-        </p:nvCxnSpPr>
-        <p:spPr>
-          <a:xfrm rot="16200000" flipH="1">
-            <a:off x="7259811" y="-609227"/>
-            <a:ext cx="592581" cy="3305185"/>
-          </a:xfrm>
-          <a:prstGeom prst="bentConnector3">
-            <a:avLst>
-              <a:gd name="adj1" fmla="val 37141"/>
-            </a:avLst>
-          </a:prstGeom>
-          <a:ln w="19050">
-            <a:solidFill>
-              <a:schemeClr val="tx1"/>
-            </a:solidFill>
-            <a:tailEnd type="arrow"/>
-          </a:ln>
-        </p:spPr>
-        <p:style>
-          <a:lnRef idx="1">
-            <a:schemeClr val="accent1"/>
-          </a:lnRef>
-          <a:fillRef idx="0">
-            <a:schemeClr val="accent1"/>
-          </a:fillRef>
-          <a:effectRef idx="0">
-            <a:schemeClr val="accent1"/>
-          </a:effectRef>
-          <a:fontRef idx="minor">
-            <a:schemeClr val="tx1"/>
-          </a:fontRef>
-        </p:style>
-      </p:cxnSp>
-      <p:sp>
-        <p:nvSpPr>
-          <p:cNvPr id="77" name="流程图: 准备 19"/>
-          <p:cNvSpPr/>
-          <p:nvPr/>
-        </p:nvSpPr>
-        <p:spPr>
-          <a:xfrm>
-            <a:off x="448353" y="1130389"/>
-            <a:ext cx="2012209" cy="726757"/>
-          </a:xfrm>
-          <a:prstGeom prst="flowChartPreparation">
-            <a:avLst/>
-          </a:prstGeom>
-          <a:solidFill>
-            <a:schemeClr val="bg1"/>
-          </a:solidFill>
-          <a:ln w="28575">
-            <a:solidFill>
-              <a:schemeClr val="tx1"/>
-            </a:solidFill>
-          </a:ln>
-          <a:effectLst>
-            <a:glow>
-              <a:schemeClr val="accent1">
-                <a:alpha val="40000"/>
-              </a:schemeClr>
-            </a:glow>
-          </a:effectLst>
-        </p:spPr>
-        <p:style>
-          <a:lnRef idx="1">
-            <a:schemeClr val="accent6"/>
-          </a:lnRef>
-          <a:fillRef idx="3">
-            <a:schemeClr val="accent6"/>
-          </a:fillRef>
-          <a:effectRef idx="2">
-            <a:schemeClr val="accent6"/>
-          </a:effectRef>
-          <a:fontRef idx="minor">
-            <a:schemeClr val="lt1"/>
-          </a:fontRef>
-        </p:style>
-        <p:txBody>
-          <a:bodyPr vertOverflow="overflow" horzOverflow="overflow" vert="horz" wrap="none" lIns="0" tIns="0" rIns="0" bIns="0" numCol="1" spcCol="0" rtlCol="0" fromWordArt="0" anchor="ctr" anchorCtr="0" forceAA="0" compatLnSpc="1">
-            <a:normAutofit lnSpcReduction="10000"/>
-          </a:bodyPr>
-          <a:lstStyle/>
-          <a:p>
-            <a:pPr lvl="0" algn="ctr"/>
-            <a:r>
-              <a:rPr lang="en-US" altLang="zh-CN" sz="1600" dirty="0">
-                <a:solidFill>
-                  <a:schemeClr val="tx1"/>
-                </a:solidFill>
-                <a:sym typeface="+mn-ea"/>
-              </a:rPr>
-              <a:t>Advanced </a:t>
-            </a:r>
-            <a:r>
-              <a:rPr lang="en-US" altLang="zh-CN" sz="1600" dirty="0" smtClean="0">
-                <a:solidFill>
-                  <a:schemeClr val="tx1"/>
-                </a:solidFill>
-                <a:sym typeface="+mn-ea"/>
-              </a:rPr>
-              <a:t>travel plan</a:t>
-            </a:r>
-          </a:p>
-          <a:p>
-            <a:pPr lvl="0" algn="ctr"/>
-            <a:r>
-              <a:rPr lang="en-US" altLang="zh-CN" sz="1600" dirty="0" smtClean="0">
-                <a:solidFill>
-                  <a:schemeClr val="tx1"/>
-                </a:solidFill>
-                <a:sym typeface="+mn-ea"/>
-              </a:rPr>
-              <a:t>14322</a:t>
-            </a:r>
-            <a:endParaRPr lang="en-US" altLang="zh-CN" sz="1600" dirty="0">
-              <a:solidFill>
-                <a:schemeClr val="tx1"/>
-              </a:solidFill>
-              <a:sym typeface="+mn-ea"/>
-            </a:endParaRPr>
-          </a:p>
-          <a:p>
-            <a:pPr lvl="0" algn="ctr"/>
-            <a:r>
-              <a:rPr lang="en-US" altLang="zh-CN" sz="1600" dirty="0">
-                <a:solidFill>
-                  <a:schemeClr val="tx1"/>
-                </a:solidFill>
-                <a:sym typeface="+mn-ea"/>
-              </a:rPr>
-              <a:t>(route info + ticket)</a:t>
-            </a:r>
-          </a:p>
-        </p:txBody>
-      </p:sp>
-      <p:sp>
-        <p:nvSpPr>
-          <p:cNvPr id="30" name="流程图: 准备 19"/>
-          <p:cNvSpPr/>
-          <p:nvPr/>
-        </p:nvSpPr>
-        <p:spPr>
-          <a:xfrm>
-            <a:off x="247290" y="2331969"/>
-            <a:ext cx="2414334" cy="572256"/>
-          </a:xfrm>
-          <a:prstGeom prst="flowChartPreparation">
-            <a:avLst/>
-          </a:prstGeom>
-          <a:solidFill>
-            <a:schemeClr val="bg1"/>
-          </a:solidFill>
-          <a:ln w="28575">
-            <a:solidFill>
-              <a:schemeClr val="tx1"/>
-            </a:solidFill>
-          </a:ln>
-          <a:effectLst>
-            <a:glow>
-              <a:schemeClr val="accent1">
-                <a:alpha val="40000"/>
-              </a:schemeClr>
-            </a:glow>
-          </a:effectLst>
-        </p:spPr>
-        <p:style>
-          <a:lnRef idx="1">
-            <a:schemeClr val="accent6"/>
-          </a:lnRef>
-          <a:fillRef idx="3">
-            <a:schemeClr val="accent6"/>
-          </a:fillRef>
-          <a:effectRef idx="2">
-            <a:schemeClr val="accent6"/>
-          </a:effectRef>
-          <a:fontRef idx="minor">
-            <a:schemeClr val="lt1"/>
-          </a:fontRef>
-        </p:style>
-        <p:txBody>
-          <a:bodyPr vertOverflow="overflow" horzOverflow="overflow" vert="horz" wrap="none" lIns="0" tIns="0" rIns="0" bIns="0" numCol="1" spcCol="0" rtlCol="0" fromWordArt="0" anchor="ctr" anchorCtr="0" forceAA="0" compatLnSpc="1">
-            <a:normAutofit/>
-          </a:bodyPr>
-          <a:lstStyle/>
-          <a:p>
-            <a:pPr lvl="0" algn="ctr"/>
-            <a:r>
-              <a:rPr lang="en-US" altLang="zh-CN" sz="1600" dirty="0">
-                <a:solidFill>
-                  <a:schemeClr val="tx1"/>
-                </a:solidFill>
-                <a:sym typeface="+mn-ea"/>
-              </a:rPr>
-              <a:t>route </a:t>
-            </a:r>
-            <a:r>
-              <a:rPr lang="en-US" altLang="zh-CN" sz="1600" dirty="0" smtClean="0">
-                <a:solidFill>
-                  <a:schemeClr val="tx1"/>
-                </a:solidFill>
-                <a:sym typeface="+mn-ea"/>
-              </a:rPr>
-              <a:t>plan 14578</a:t>
-            </a:r>
-            <a:endParaRPr lang="en-US" altLang="zh-CN" sz="1600" dirty="0">
-              <a:solidFill>
-                <a:schemeClr val="tx1"/>
-              </a:solidFill>
-              <a:sym typeface="+mn-ea"/>
-            </a:endParaRPr>
-          </a:p>
-          <a:p>
-            <a:pPr lvl="0" algn="ctr"/>
-            <a:r>
-              <a:rPr lang="en-US" altLang="zh-CN" sz="1600" dirty="0">
-                <a:solidFill>
-                  <a:schemeClr val="tx1"/>
-                </a:solidFill>
-                <a:sym typeface="+mn-ea"/>
-              </a:rPr>
-              <a:t>(price, change, time)</a:t>
-            </a:r>
-          </a:p>
-        </p:txBody>
-      </p:sp>
-      <p:sp>
-        <p:nvSpPr>
-          <p:cNvPr id="31" name="流程图: 准备 19"/>
-          <p:cNvSpPr/>
-          <p:nvPr/>
-        </p:nvSpPr>
-        <p:spPr>
-          <a:xfrm>
-            <a:off x="9889809" y="1278087"/>
-            <a:ext cx="1072505" cy="442999"/>
-          </a:xfrm>
-          <a:prstGeom prst="flowChartPreparation">
-            <a:avLst/>
-          </a:prstGeom>
-          <a:solidFill>
-            <a:schemeClr val="bg1"/>
-          </a:solidFill>
-          <a:ln w="28575">
-            <a:solidFill>
-              <a:schemeClr val="tx1"/>
-            </a:solidFill>
-          </a:ln>
-          <a:effectLst>
-            <a:glow>
-              <a:schemeClr val="accent1">
-                <a:alpha val="40000"/>
-              </a:schemeClr>
-            </a:glow>
-          </a:effectLst>
-        </p:spPr>
-        <p:style>
-          <a:lnRef idx="1">
-            <a:schemeClr val="accent6"/>
-          </a:lnRef>
-          <a:fillRef idx="3">
-            <a:schemeClr val="accent6"/>
-          </a:fillRef>
-          <a:effectRef idx="2">
-            <a:schemeClr val="accent6"/>
-          </a:effectRef>
-          <a:fontRef idx="minor">
-            <a:schemeClr val="lt1"/>
-          </a:fontRef>
-        </p:style>
-        <p:txBody>
-          <a:bodyPr vertOverflow="overflow" horzOverflow="overflow" vert="horz" wrap="none" lIns="0" tIns="0" rIns="0" bIns="0" numCol="1" spcCol="0" rtlCol="0" fromWordArt="0" anchor="ctr" anchorCtr="0" forceAA="0" compatLnSpc="1">
-            <a:normAutofit/>
-          </a:bodyPr>
-          <a:lstStyle/>
-          <a:p>
-            <a:pPr lvl="0" algn="ctr"/>
-            <a:r>
-              <a:rPr lang="en-US" altLang="zh-CN" sz="1400" dirty="0">
-                <a:solidFill>
-                  <a:schemeClr val="tx1"/>
-                </a:solidFill>
-                <a:sym typeface="+mn-ea"/>
-              </a:rPr>
-              <a:t>ticket </a:t>
-            </a:r>
-            <a:r>
-              <a:rPr lang="en-US" altLang="zh-CN" sz="1400" dirty="0" smtClean="0">
-                <a:solidFill>
-                  <a:schemeClr val="tx1"/>
-                </a:solidFill>
-                <a:sym typeface="+mn-ea"/>
-              </a:rPr>
-              <a:t>office</a:t>
-            </a:r>
-          </a:p>
-          <a:p>
-            <a:pPr lvl="0" algn="ctr"/>
-            <a:r>
-              <a:rPr lang="en-US" altLang="zh-CN" sz="1400" dirty="0" smtClean="0">
-                <a:solidFill>
-                  <a:schemeClr val="tx1"/>
-                </a:solidFill>
-                <a:sym typeface="+mn-ea"/>
-              </a:rPr>
-              <a:t>16108</a:t>
-            </a:r>
-            <a:endParaRPr lang="en-US" altLang="zh-CN" sz="1400" dirty="0">
-              <a:solidFill>
-                <a:schemeClr val="tx1"/>
-              </a:solidFill>
-              <a:sym typeface="+mn-ea"/>
-            </a:endParaRPr>
-          </a:p>
-        </p:txBody>
-      </p:sp>
-      <p:cxnSp>
-        <p:nvCxnSpPr>
-          <p:cNvPr id="32" name="肘形连接符 33"/>
-          <p:cNvCxnSpPr>
-            <a:stCxn id="107" idx="2"/>
-            <a:endCxn id="31" idx="0"/>
-          </p:cNvCxnSpPr>
-          <p:nvPr/>
-        </p:nvCxnSpPr>
-        <p:spPr>
-          <a:xfrm rot="16200000" flipH="1">
-            <a:off x="7899280" y="-1248696"/>
-            <a:ext cx="531011" cy="4522553"/>
-          </a:xfrm>
-          <a:prstGeom prst="bentConnector3">
-            <a:avLst>
-              <a:gd name="adj1" fmla="val 41390"/>
-            </a:avLst>
-          </a:prstGeom>
-          <a:ln w="19050">
-            <a:solidFill>
-              <a:schemeClr val="tx1"/>
-            </a:solidFill>
-            <a:tailEnd type="arrow"/>
-          </a:ln>
-        </p:spPr>
-        <p:style>
-          <a:lnRef idx="1">
-            <a:schemeClr val="accent1"/>
-          </a:lnRef>
-          <a:fillRef idx="0">
-            <a:schemeClr val="accent1"/>
-          </a:fillRef>
-          <a:effectRef idx="0">
-            <a:schemeClr val="accent1"/>
-          </a:effectRef>
-          <a:fontRef idx="minor">
-            <a:schemeClr val="tx1"/>
-          </a:fontRef>
-        </p:style>
-      </p:cxnSp>
-      <p:sp>
-        <p:nvSpPr>
-          <p:cNvPr id="33" name="流程图: 准备 19"/>
-          <p:cNvSpPr/>
-          <p:nvPr/>
-        </p:nvSpPr>
-        <p:spPr>
-          <a:xfrm>
-            <a:off x="9876704" y="2395305"/>
-            <a:ext cx="1053465" cy="513080"/>
-          </a:xfrm>
-          <a:prstGeom prst="flowChartPreparation">
-            <a:avLst/>
-          </a:prstGeom>
-          <a:solidFill>
-            <a:schemeClr val="bg1"/>
-          </a:solidFill>
-          <a:ln w="28575">
-            <a:solidFill>
-              <a:schemeClr val="tx1"/>
-            </a:solidFill>
-          </a:ln>
-          <a:effectLst>
-            <a:glow>
-              <a:schemeClr val="accent1">
-                <a:alpha val="40000"/>
-              </a:schemeClr>
-            </a:glow>
-          </a:effectLst>
-        </p:spPr>
-        <p:style>
-          <a:lnRef idx="1">
-            <a:schemeClr val="accent6"/>
-          </a:lnRef>
-          <a:fillRef idx="3">
-            <a:schemeClr val="accent6"/>
-          </a:fillRef>
-          <a:effectRef idx="2">
-            <a:schemeClr val="accent6"/>
-          </a:effectRef>
-          <a:fontRef idx="minor">
-            <a:schemeClr val="lt1"/>
-          </a:fontRef>
-        </p:style>
-        <p:txBody>
-          <a:bodyPr vertOverflow="overflow" horzOverflow="overflow" vert="horz" wrap="none" lIns="0" tIns="0" rIns="0" bIns="0" numCol="1" spcCol="0" rtlCol="0" fromWordArt="0" anchor="ctr" anchorCtr="0" forceAA="0" compatLnSpc="1">
-            <a:normAutofit/>
-          </a:bodyPr>
-          <a:lstStyle/>
-          <a:p>
-            <a:pPr lvl="0" algn="ctr"/>
-            <a:r>
-              <a:rPr lang="en-US" altLang="zh-CN" sz="1400" dirty="0" smtClean="0">
-                <a:solidFill>
-                  <a:schemeClr val="tx1"/>
-                </a:solidFill>
-                <a:sym typeface="+mn-ea"/>
-              </a:rPr>
-              <a:t>Consign</a:t>
-            </a:r>
-          </a:p>
-          <a:p>
-            <a:pPr lvl="0" algn="ctr"/>
-            <a:r>
-              <a:rPr lang="en-US" altLang="zh-CN" sz="1400" dirty="0" smtClean="0">
-                <a:solidFill>
-                  <a:schemeClr val="tx1"/>
-                </a:solidFill>
-                <a:sym typeface="+mn-ea"/>
-              </a:rPr>
-              <a:t>16111</a:t>
-            </a:r>
-            <a:endParaRPr lang="en-US" altLang="zh-CN" sz="1400" dirty="0">
-              <a:solidFill>
-                <a:schemeClr val="tx1"/>
-              </a:solidFill>
-              <a:sym typeface="+mn-ea"/>
-            </a:endParaRPr>
-          </a:p>
-        </p:txBody>
-      </p:sp>
-      <p:sp>
-        <p:nvSpPr>
-          <p:cNvPr id="37" name="流程图: 准备 19"/>
-          <p:cNvSpPr/>
-          <p:nvPr/>
-        </p:nvSpPr>
-        <p:spPr>
-          <a:xfrm>
-            <a:off x="9809393" y="3473801"/>
-            <a:ext cx="1188085" cy="513080"/>
-          </a:xfrm>
-          <a:prstGeom prst="flowChartPreparation">
-            <a:avLst/>
-          </a:prstGeom>
-          <a:solidFill>
-            <a:schemeClr val="bg1"/>
-          </a:solidFill>
-          <a:ln w="28575">
-            <a:solidFill>
-              <a:schemeClr val="tx1"/>
-            </a:solidFill>
-          </a:ln>
-          <a:effectLst>
-            <a:glow>
-              <a:schemeClr val="accent1">
-                <a:alpha val="40000"/>
-              </a:schemeClr>
-            </a:glow>
-          </a:effectLst>
-        </p:spPr>
-        <p:style>
-          <a:lnRef idx="1">
-            <a:schemeClr val="accent6"/>
-          </a:lnRef>
-          <a:fillRef idx="3">
-            <a:schemeClr val="accent6"/>
-          </a:fillRef>
-          <a:effectRef idx="2">
-            <a:schemeClr val="accent6"/>
-          </a:effectRef>
-          <a:fontRef idx="minor">
-            <a:schemeClr val="lt1"/>
-          </a:fontRef>
-        </p:style>
-        <p:txBody>
-          <a:bodyPr vertOverflow="overflow" horzOverflow="overflow" vert="horz" wrap="none" lIns="0" tIns="0" rIns="0" bIns="0" numCol="1" spcCol="0" rtlCol="0" fromWordArt="0" anchor="ctr" anchorCtr="0" forceAA="0" compatLnSpc="1">
-            <a:normAutofit/>
-          </a:bodyPr>
-          <a:lstStyle/>
-          <a:p>
-            <a:pPr lvl="0" algn="ctr"/>
-            <a:r>
-              <a:rPr lang="en-US" altLang="zh-CN" sz="1400" dirty="0">
-                <a:solidFill>
-                  <a:schemeClr val="tx1"/>
-                </a:solidFill>
-                <a:sym typeface="+mn-ea"/>
-              </a:rPr>
-              <a:t>consign </a:t>
-            </a:r>
-            <a:r>
-              <a:rPr lang="en-US" altLang="zh-CN" sz="1400" dirty="0" smtClean="0">
-                <a:solidFill>
-                  <a:schemeClr val="tx1"/>
-                </a:solidFill>
-                <a:sym typeface="+mn-ea"/>
-              </a:rPr>
-              <a:t>price</a:t>
-            </a:r>
-          </a:p>
-          <a:p>
-            <a:pPr lvl="0" algn="ctr"/>
-            <a:r>
-              <a:rPr lang="en-US" altLang="zh-CN" sz="1400" dirty="0" smtClean="0">
-                <a:solidFill>
-                  <a:schemeClr val="tx1"/>
-                </a:solidFill>
-                <a:sym typeface="+mn-ea"/>
-              </a:rPr>
-              <a:t>16110</a:t>
-            </a:r>
-            <a:endParaRPr lang="en-US" altLang="zh-CN" sz="1400" dirty="0">
-              <a:solidFill>
-                <a:schemeClr val="tx1"/>
-              </a:solidFill>
-              <a:sym typeface="+mn-ea"/>
-            </a:endParaRPr>
-          </a:p>
-        </p:txBody>
-      </p:sp>
-      <p:cxnSp>
-        <p:nvCxnSpPr>
-          <p:cNvPr id="39" name="Straight Arrow Connector 78"/>
-          <p:cNvCxnSpPr>
-            <a:stCxn id="33" idx="2"/>
-            <a:endCxn id="37" idx="0"/>
-          </p:cNvCxnSpPr>
-          <p:nvPr/>
-        </p:nvCxnSpPr>
-        <p:spPr>
-          <a:xfrm flipH="1">
-            <a:off x="10403436" y="2908385"/>
-            <a:ext cx="1" cy="565416"/>
-          </a:xfrm>
-          <a:prstGeom prst="straightConnector1">
-            <a:avLst/>
-          </a:prstGeom>
-          <a:ln>
-            <a:tailEnd type="arrow" w="lg" len="lg"/>
-          </a:ln>
-        </p:spPr>
-        <p:style>
-          <a:lnRef idx="1">
-            <a:schemeClr val="accent1"/>
-          </a:lnRef>
-          <a:fillRef idx="0">
-            <a:schemeClr val="accent1"/>
-          </a:fillRef>
-          <a:effectRef idx="0">
-            <a:schemeClr val="accent1"/>
-          </a:effectRef>
-          <a:fontRef idx="minor">
-            <a:schemeClr val="tx1"/>
-          </a:fontRef>
-        </p:style>
-      </p:cxnSp>
-      <p:sp>
-        <p:nvSpPr>
-          <p:cNvPr id="42" name="流程图: 准备 19"/>
-          <p:cNvSpPr/>
-          <p:nvPr/>
-        </p:nvSpPr>
-        <p:spPr>
-          <a:xfrm>
-            <a:off x="3427326" y="3642933"/>
-            <a:ext cx="1053465" cy="513080"/>
-          </a:xfrm>
-          <a:prstGeom prst="flowChartPreparation">
-            <a:avLst/>
-          </a:prstGeom>
-          <a:solidFill>
-            <a:schemeClr val="bg1"/>
-          </a:solidFill>
-          <a:ln w="28575">
-            <a:solidFill>
-              <a:schemeClr val="tx1"/>
-            </a:solidFill>
-          </a:ln>
-          <a:effectLst>
-            <a:glow>
-              <a:schemeClr val="accent1">
-                <a:alpha val="40000"/>
-              </a:schemeClr>
-            </a:glow>
-          </a:effectLst>
-        </p:spPr>
-        <p:style>
-          <a:lnRef idx="1">
-            <a:schemeClr val="accent6"/>
-          </a:lnRef>
-          <a:fillRef idx="3">
-            <a:schemeClr val="accent6"/>
-          </a:fillRef>
-          <a:effectRef idx="2">
-            <a:schemeClr val="accent6"/>
-          </a:effectRef>
-          <a:fontRef idx="minor">
-            <a:schemeClr val="lt1"/>
-          </a:fontRef>
-        </p:style>
-        <p:txBody>
-          <a:bodyPr vertOverflow="overflow" horzOverflow="overflow" vert="horz" wrap="none" lIns="0" tIns="0" rIns="0" bIns="0" numCol="1" spcCol="0" rtlCol="0" fromWordArt="0" anchor="ctr" anchorCtr="0" forceAA="0" compatLnSpc="1">
-            <a:normAutofit/>
-          </a:bodyPr>
-          <a:lstStyle/>
-          <a:p>
-            <a:pPr lvl="0" algn="ctr"/>
-            <a:r>
-              <a:rPr lang="en-US" altLang="zh-CN" sz="1400" dirty="0" smtClean="0">
-                <a:solidFill>
-                  <a:schemeClr val="tx1"/>
-                </a:solidFill>
-                <a:sym typeface="+mn-ea"/>
-              </a:rPr>
-              <a:t>Voucher</a:t>
-            </a:r>
-          </a:p>
-          <a:p>
-            <a:pPr lvl="0" algn="ctr"/>
-            <a:r>
-              <a:rPr lang="en-US" altLang="zh-CN" sz="1400" dirty="0" smtClean="0">
-                <a:solidFill>
-                  <a:schemeClr val="tx1"/>
-                </a:solidFill>
-                <a:sym typeface="+mn-ea"/>
-              </a:rPr>
-              <a:t>16101</a:t>
-            </a:r>
-            <a:endParaRPr lang="en-US" altLang="zh-CN" sz="1400" dirty="0">
-              <a:solidFill>
-                <a:schemeClr val="tx1"/>
-              </a:solidFill>
-              <a:sym typeface="+mn-ea"/>
-            </a:endParaRPr>
-          </a:p>
-        </p:txBody>
-      </p:sp>
-      <p:sp>
-        <p:nvSpPr>
-          <p:cNvPr id="73" name="流程图: 准备 19"/>
-          <p:cNvSpPr/>
-          <p:nvPr/>
-        </p:nvSpPr>
-        <p:spPr>
-          <a:xfrm>
-            <a:off x="1373338" y="5386499"/>
-            <a:ext cx="1061083" cy="484319"/>
-          </a:xfrm>
-          <a:prstGeom prst="flowChartPreparation">
-            <a:avLst/>
-          </a:prstGeom>
-          <a:solidFill>
-            <a:schemeClr val="bg1"/>
-          </a:solidFill>
-          <a:ln w="28575">
-            <a:solidFill>
-              <a:schemeClr val="tx1"/>
-            </a:solidFill>
-          </a:ln>
-          <a:effectLst>
-            <a:glow>
-              <a:schemeClr val="accent1">
-                <a:alpha val="40000"/>
-              </a:schemeClr>
-            </a:glow>
-          </a:effectLst>
-        </p:spPr>
-        <p:style>
-          <a:lnRef idx="1">
-            <a:schemeClr val="accent6"/>
-          </a:lnRef>
-          <a:fillRef idx="3">
-            <a:schemeClr val="accent6"/>
-          </a:fillRef>
-          <a:effectRef idx="2">
-            <a:schemeClr val="accent6"/>
-          </a:effectRef>
-          <a:fontRef idx="minor">
-            <a:schemeClr val="lt1"/>
-          </a:fontRef>
-        </p:style>
-        <p:txBody>
-          <a:bodyPr vertOverflow="overflow" horzOverflow="overflow" vert="horz" wrap="none" lIns="0" tIns="0" rIns="0" bIns="0" numCol="1" spcCol="0" rtlCol="0" fromWordArt="0" anchor="ctr" anchorCtr="0" forceAA="0" compatLnSpc="1">
-            <a:normAutofit/>
-          </a:bodyPr>
-          <a:lstStyle/>
-          <a:p>
-            <a:pPr lvl="0" algn="ctr"/>
-            <a:r>
-              <a:rPr lang="en-US" altLang="zh-CN" sz="1400" dirty="0">
-                <a:ln w="0"/>
-                <a:solidFill>
-                  <a:schemeClr val="tx1"/>
-                </a:solidFill>
-                <a:effectLst>
-                  <a:outerShdw blurRad="38100" dist="19050" dir="2700000" algn="tl" rotWithShape="0">
-                    <a:schemeClr val="dk1">
-                      <a:alpha val="40000"/>
-                    </a:schemeClr>
-                  </a:outerShdw>
-                </a:effectLst>
-                <a:sym typeface="+mn-ea"/>
-              </a:rPr>
-              <a:t>Food </a:t>
-            </a:r>
-            <a:r>
-              <a:rPr lang="en-US" altLang="zh-CN" sz="1400" dirty="0" smtClean="0">
-                <a:ln w="0"/>
-                <a:solidFill>
-                  <a:schemeClr val="tx1"/>
-                </a:solidFill>
-                <a:effectLst>
-                  <a:outerShdw blurRad="38100" dist="19050" dir="2700000" algn="tl" rotWithShape="0">
-                    <a:schemeClr val="dk1">
-                      <a:alpha val="40000"/>
-                    </a:schemeClr>
-                  </a:outerShdw>
-                </a:effectLst>
-                <a:sym typeface="+mn-ea"/>
-              </a:rPr>
-              <a:t>map</a:t>
-            </a:r>
-          </a:p>
-          <a:p>
-            <a:pPr lvl="0" algn="ctr"/>
-            <a:r>
-              <a:rPr lang="en-US" altLang="zh-CN" sz="1400" dirty="0" smtClean="0">
-                <a:ln w="0"/>
-                <a:solidFill>
-                  <a:schemeClr val="tx1"/>
-                </a:solidFill>
-                <a:effectLst>
-                  <a:outerShdw blurRad="38100" dist="19050" dir="2700000" algn="tl" rotWithShape="0">
-                    <a:schemeClr val="dk1">
-                      <a:alpha val="40000"/>
-                    </a:schemeClr>
-                  </a:outerShdw>
-                </a:effectLst>
-                <a:sym typeface="+mn-ea"/>
-              </a:rPr>
               <a:t>18855</a:t>
             </a:r>
-            <a:endParaRPr lang="en-US" altLang="zh-CN" sz="1400" dirty="0">
-              <a:ln w="0"/>
-              <a:solidFill>
-                <a:schemeClr val="tx1"/>
-              </a:solidFill>
-              <a:effectLst>
-                <a:outerShdw blurRad="38100" dist="19050" dir="2700000" algn="tl" rotWithShape="0">
-                  <a:schemeClr val="dk1">
-                    <a:alpha val="40000"/>
-                  </a:schemeClr>
-                </a:outerShdw>
-              </a:effectLst>
-              <a:sym typeface="+mn-ea"/>
-            </a:endParaRPr>
           </a:p>
         </p:txBody>
       </p:sp>
@@ -25721,7 +25361,7 @@
           <a:p>
             <a:pPr lvl="0" algn="ctr"/>
             <a:r>
-              <a:rPr lang="en-US" altLang="zh-CN" sz="1400" dirty="0" smtClean="0">
+              <a:rPr lang="en-US" altLang="zh-CN" sz="1400" dirty="0">
                 <a:solidFill>
                   <a:schemeClr val="tx1"/>
                 </a:solidFill>
@@ -25733,7 +25373,7 @@
           <a:p>
             <a:pPr lvl="0" algn="ctr"/>
             <a:r>
-              <a:rPr lang="en-US" altLang="zh-CN" sz="1400" dirty="0" smtClean="0">
+              <a:rPr lang="en-US" altLang="zh-CN" sz="1400" dirty="0">
                 <a:solidFill>
                   <a:schemeClr val="tx1"/>
                 </a:solidFill>
@@ -25741,12 +25381,6 @@
               </a:rPr>
               <a:t>14322</a:t>
             </a:r>
-            <a:endParaRPr lang="en-US" altLang="zh-CN" sz="1400" dirty="0">
-              <a:solidFill>
-                <a:schemeClr val="tx1"/>
-              </a:solidFill>
-              <a:sym typeface="+mn-ea"/>
-            </a:endParaRPr>
           </a:p>
         </p:txBody>
       </p:sp>

</xml_diff>